<commit_message>
Added theta forcing function
</commit_message>
<xml_diff>
--- a/Weekly update.pptx
+++ b/Weekly update.pptx
@@ -5,7 +5,7 @@
     <p:sldMasterId id="2147483660" r:id="rId1"/>
   </p:sldMasterIdLst>
   <p:notesMasterIdLst>
-    <p:notesMasterId r:id="rId46"/>
+    <p:notesMasterId r:id="rId49"/>
   </p:notesMasterIdLst>
   <p:sldIdLst>
     <p:sldId id="256" r:id="rId2"/>
@@ -13,45 +13,48 @@
     <p:sldId id="260" r:id="rId4"/>
     <p:sldId id="258" r:id="rId5"/>
     <p:sldId id="327" r:id="rId6"/>
-    <p:sldId id="321" r:id="rId7"/>
-    <p:sldId id="320" r:id="rId8"/>
-    <p:sldId id="322" r:id="rId9"/>
-    <p:sldId id="323" r:id="rId10"/>
-    <p:sldId id="328" r:id="rId11"/>
-    <p:sldId id="329" r:id="rId12"/>
-    <p:sldId id="326" r:id="rId13"/>
-    <p:sldId id="314" r:id="rId14"/>
-    <p:sldId id="305" r:id="rId15"/>
-    <p:sldId id="306" r:id="rId16"/>
-    <p:sldId id="307" r:id="rId17"/>
-    <p:sldId id="299" r:id="rId18"/>
-    <p:sldId id="300" r:id="rId19"/>
-    <p:sldId id="308" r:id="rId20"/>
-    <p:sldId id="293" r:id="rId21"/>
-    <p:sldId id="294" r:id="rId22"/>
-    <p:sldId id="295" r:id="rId23"/>
-    <p:sldId id="296" r:id="rId24"/>
-    <p:sldId id="309" r:id="rId25"/>
-    <p:sldId id="313" r:id="rId26"/>
-    <p:sldId id="310" r:id="rId27"/>
-    <p:sldId id="311" r:id="rId28"/>
-    <p:sldId id="312" r:id="rId29"/>
-    <p:sldId id="277" r:id="rId30"/>
-    <p:sldId id="297" r:id="rId31"/>
-    <p:sldId id="298" r:id="rId32"/>
-    <p:sldId id="301" r:id="rId33"/>
-    <p:sldId id="302" r:id="rId34"/>
-    <p:sldId id="303" r:id="rId35"/>
-    <p:sldId id="286" r:id="rId36"/>
-    <p:sldId id="287" r:id="rId37"/>
-    <p:sldId id="292" r:id="rId38"/>
-    <p:sldId id="289" r:id="rId39"/>
-    <p:sldId id="262" r:id="rId40"/>
-    <p:sldId id="274" r:id="rId41"/>
-    <p:sldId id="279" r:id="rId42"/>
-    <p:sldId id="284" r:id="rId43"/>
-    <p:sldId id="280" r:id="rId44"/>
-    <p:sldId id="281" r:id="rId45"/>
+    <p:sldId id="330" r:id="rId7"/>
+    <p:sldId id="332" r:id="rId8"/>
+    <p:sldId id="331" r:id="rId9"/>
+    <p:sldId id="320" r:id="rId10"/>
+    <p:sldId id="321" r:id="rId11"/>
+    <p:sldId id="322" r:id="rId12"/>
+    <p:sldId id="323" r:id="rId13"/>
+    <p:sldId id="328" r:id="rId14"/>
+    <p:sldId id="329" r:id="rId15"/>
+    <p:sldId id="326" r:id="rId16"/>
+    <p:sldId id="314" r:id="rId17"/>
+    <p:sldId id="305" r:id="rId18"/>
+    <p:sldId id="306" r:id="rId19"/>
+    <p:sldId id="307" r:id="rId20"/>
+    <p:sldId id="299" r:id="rId21"/>
+    <p:sldId id="300" r:id="rId22"/>
+    <p:sldId id="308" r:id="rId23"/>
+    <p:sldId id="293" r:id="rId24"/>
+    <p:sldId id="294" r:id="rId25"/>
+    <p:sldId id="295" r:id="rId26"/>
+    <p:sldId id="296" r:id="rId27"/>
+    <p:sldId id="309" r:id="rId28"/>
+    <p:sldId id="313" r:id="rId29"/>
+    <p:sldId id="310" r:id="rId30"/>
+    <p:sldId id="311" r:id="rId31"/>
+    <p:sldId id="312" r:id="rId32"/>
+    <p:sldId id="277" r:id="rId33"/>
+    <p:sldId id="297" r:id="rId34"/>
+    <p:sldId id="298" r:id="rId35"/>
+    <p:sldId id="301" r:id="rId36"/>
+    <p:sldId id="302" r:id="rId37"/>
+    <p:sldId id="303" r:id="rId38"/>
+    <p:sldId id="286" r:id="rId39"/>
+    <p:sldId id="287" r:id="rId40"/>
+    <p:sldId id="292" r:id="rId41"/>
+    <p:sldId id="289" r:id="rId42"/>
+    <p:sldId id="262" r:id="rId43"/>
+    <p:sldId id="274" r:id="rId44"/>
+    <p:sldId id="279" r:id="rId45"/>
+    <p:sldId id="284" r:id="rId46"/>
+    <p:sldId id="280" r:id="rId47"/>
+    <p:sldId id="281" r:id="rId48"/>
   </p:sldIdLst>
   <p:sldSz cx="12192000" cy="6858000"/>
   <p:notesSz cx="6858000" cy="9144000"/>
@@ -240,7 +243,7 @@
           <a:p>
             <a:fld id="{8DF1912D-B68E-4861-BCFA-878407B06518}" type="datetimeFigureOut">
               <a:rPr lang="en-US" smtClean="0"/>
-              <a:t>7/15/2024</a:t>
+              <a:t>7/22/2024</a:t>
             </a:fld>
             <a:endParaRPr lang="en-US"/>
           </a:p>
@@ -775,7 +778,7 @@
           <a:p>
             <a:fld id="{0437A4BF-0174-4E1F-9060-7071690D8379}" type="slidenum">
               <a:rPr lang="en-US" smtClean="0"/>
-              <a:t>39</a:t>
+              <a:t>42</a:t>
             </a:fld>
             <a:endParaRPr lang="en-US"/>
           </a:p>
@@ -1516,7 +1519,7 @@
           <a:p>
             <a:fld id="{425853DC-1396-4DFF-9033-27BF2162C664}" type="datetimeFigureOut">
               <a:rPr lang="en-US" smtClean="0"/>
-              <a:t>7/15/2024</a:t>
+              <a:t>7/22/2024</a:t>
             </a:fld>
             <a:endParaRPr lang="en-US"/>
           </a:p>
@@ -1767,7 +1770,7 @@
           <a:p>
             <a:fld id="{425853DC-1396-4DFF-9033-27BF2162C664}" type="datetimeFigureOut">
               <a:rPr lang="en-US" smtClean="0"/>
-              <a:t>7/15/2024</a:t>
+              <a:t>7/22/2024</a:t>
             </a:fld>
             <a:endParaRPr lang="en-US"/>
           </a:p>
@@ -2081,7 +2084,7 @@
           <a:p>
             <a:fld id="{425853DC-1396-4DFF-9033-27BF2162C664}" type="datetimeFigureOut">
               <a:rPr lang="en-US" smtClean="0"/>
-              <a:t>7/15/2024</a:t>
+              <a:t>7/22/2024</a:t>
             </a:fld>
             <a:endParaRPr lang="en-US"/>
           </a:p>
@@ -2422,7 +2425,7 @@
           <a:p>
             <a:fld id="{425853DC-1396-4DFF-9033-27BF2162C664}" type="datetimeFigureOut">
               <a:rPr lang="en-US" smtClean="0"/>
-              <a:t>7/15/2024</a:t>
+              <a:t>7/22/2024</a:t>
             </a:fld>
             <a:endParaRPr lang="en-US"/>
           </a:p>
@@ -2736,7 +2739,7 @@
           <a:p>
             <a:fld id="{425853DC-1396-4DFF-9033-27BF2162C664}" type="datetimeFigureOut">
               <a:rPr lang="en-US" smtClean="0"/>
-              <a:t>7/15/2024</a:t>
+              <a:t>7/22/2024</a:t>
             </a:fld>
             <a:endParaRPr lang="en-US"/>
           </a:p>
@@ -3129,7 +3132,7 @@
           <a:p>
             <a:fld id="{425853DC-1396-4DFF-9033-27BF2162C664}" type="datetimeFigureOut">
               <a:rPr lang="en-US" smtClean="0"/>
-              <a:t>7/15/2024</a:t>
+              <a:t>7/22/2024</a:t>
             </a:fld>
             <a:endParaRPr lang="en-US"/>
           </a:p>
@@ -3299,7 +3302,7 @@
           <a:p>
             <a:fld id="{425853DC-1396-4DFF-9033-27BF2162C664}" type="datetimeFigureOut">
               <a:rPr lang="en-US" smtClean="0"/>
-              <a:t>7/15/2024</a:t>
+              <a:t>7/22/2024</a:t>
             </a:fld>
             <a:endParaRPr lang="en-US"/>
           </a:p>
@@ -3479,7 +3482,7 @@
           <a:p>
             <a:fld id="{425853DC-1396-4DFF-9033-27BF2162C664}" type="datetimeFigureOut">
               <a:rPr lang="en-US" smtClean="0"/>
-              <a:t>7/15/2024</a:t>
+              <a:t>7/22/2024</a:t>
             </a:fld>
             <a:endParaRPr lang="en-US"/>
           </a:p>
@@ -3655,7 +3658,7 @@
           <a:p>
             <a:fld id="{425853DC-1396-4DFF-9033-27BF2162C664}" type="datetimeFigureOut">
               <a:rPr lang="en-US" smtClean="0"/>
-              <a:t>7/15/2024</a:t>
+              <a:t>7/22/2024</a:t>
             </a:fld>
             <a:endParaRPr lang="en-US"/>
           </a:p>
@@ -3902,7 +3905,7 @@
           <a:p>
             <a:fld id="{425853DC-1396-4DFF-9033-27BF2162C664}" type="datetimeFigureOut">
               <a:rPr lang="en-US" smtClean="0"/>
-              <a:t>7/15/2024</a:t>
+              <a:t>7/22/2024</a:t>
             </a:fld>
             <a:endParaRPr lang="en-US"/>
           </a:p>
@@ -4134,7 +4137,7 @@
           <a:p>
             <a:fld id="{425853DC-1396-4DFF-9033-27BF2162C664}" type="datetimeFigureOut">
               <a:rPr lang="en-US" smtClean="0"/>
-              <a:t>7/15/2024</a:t>
+              <a:t>7/22/2024</a:t>
             </a:fld>
             <a:endParaRPr lang="en-US"/>
           </a:p>
@@ -4508,7 +4511,7 @@
           <a:p>
             <a:fld id="{425853DC-1396-4DFF-9033-27BF2162C664}" type="datetimeFigureOut">
               <a:rPr lang="en-US" smtClean="0"/>
-              <a:t>7/15/2024</a:t>
+              <a:t>7/22/2024</a:t>
             </a:fld>
             <a:endParaRPr lang="en-US"/>
           </a:p>
@@ -4631,7 +4634,7 @@
           <a:p>
             <a:fld id="{425853DC-1396-4DFF-9033-27BF2162C664}" type="datetimeFigureOut">
               <a:rPr lang="en-US" smtClean="0"/>
-              <a:t>7/15/2024</a:t>
+              <a:t>7/22/2024</a:t>
             </a:fld>
             <a:endParaRPr lang="en-US"/>
           </a:p>
@@ -4726,7 +4729,7 @@
           <a:p>
             <a:fld id="{425853DC-1396-4DFF-9033-27BF2162C664}" type="datetimeFigureOut">
               <a:rPr lang="en-US" smtClean="0"/>
-              <a:t>7/15/2024</a:t>
+              <a:t>7/22/2024</a:t>
             </a:fld>
             <a:endParaRPr lang="en-US"/>
           </a:p>
@@ -4981,7 +4984,7 @@
           <a:p>
             <a:fld id="{425853DC-1396-4DFF-9033-27BF2162C664}" type="datetimeFigureOut">
               <a:rPr lang="en-US" smtClean="0"/>
-              <a:t>7/15/2024</a:t>
+              <a:t>7/22/2024</a:t>
             </a:fld>
             <a:endParaRPr lang="en-US"/>
           </a:p>
@@ -5244,7 +5247,7 @@
           <a:p>
             <a:fld id="{425853DC-1396-4DFF-9033-27BF2162C664}" type="datetimeFigureOut">
               <a:rPr lang="en-US" smtClean="0"/>
-              <a:t>7/15/2024</a:t>
+              <a:t>7/22/2024</a:t>
             </a:fld>
             <a:endParaRPr lang="en-US"/>
           </a:p>
@@ -5987,7 +5990,7 @@
           <a:p>
             <a:fld id="{425853DC-1396-4DFF-9033-27BF2162C664}" type="datetimeFigureOut">
               <a:rPr lang="en-US" smtClean="0"/>
-              <a:t>7/15/2024</a:t>
+              <a:t>7/22/2024</a:t>
             </a:fld>
             <a:endParaRPr lang="en-US"/>
           </a:p>
@@ -6604,6 +6607,399 @@
           <p:cNvPr id="2" name="Title 1">
             <a:extLst>
               <a:ext uri="{FF2B5EF4-FFF2-40B4-BE49-F238E27FC236}">
+                <a16:creationId xmlns:a16="http://schemas.microsoft.com/office/drawing/2014/main" id="{87DDA15E-8EDF-F048-4393-F170395C7488}"/>
+              </a:ext>
+            </a:extLst>
+          </p:cNvPr>
+          <p:cNvSpPr>
+            <a:spLocks noGrp="1"/>
+          </p:cNvSpPr>
+          <p:nvPr>
+            <p:ph type="title"/>
+          </p:nvPr>
+        </p:nvSpPr>
+        <p:spPr/>
+        <p:txBody>
+          <a:bodyPr/>
+          <a:lstStyle/>
+          <a:p>
+            <a:r>
+              <a:rPr lang="en-GB" dirty="0"/>
+              <a:t>Method</a:t>
+            </a:r>
+          </a:p>
+        </p:txBody>
+      </p:sp>
+      <p:sp>
+        <p:nvSpPr>
+          <p:cNvPr id="3" name="Content Placeholder 2">
+            <a:extLst>
+              <a:ext uri="{FF2B5EF4-FFF2-40B4-BE49-F238E27FC236}">
+                <a16:creationId xmlns:a16="http://schemas.microsoft.com/office/drawing/2014/main" id="{A5367758-8372-E52E-14D0-31E78C61FEC7}"/>
+              </a:ext>
+            </a:extLst>
+          </p:cNvPr>
+          <p:cNvSpPr>
+            <a:spLocks noGrp="1"/>
+          </p:cNvSpPr>
+          <p:nvPr>
+            <p:ph idx="1"/>
+          </p:nvPr>
+        </p:nvSpPr>
+        <p:spPr/>
+        <p:txBody>
+          <a:bodyPr/>
+          <a:lstStyle/>
+          <a:p>
+            <a:r>
+              <a:rPr lang="en-GB" dirty="0"/>
+              <a:t>Use the input to generate the speed and pitching angles</a:t>
+            </a:r>
+          </a:p>
+          <a:p>
+            <a:r>
+              <a:rPr lang="en-GB" dirty="0"/>
+              <a:t>Fix z to -5 metres (on the ground)</a:t>
+            </a:r>
+          </a:p>
+          <a:p>
+            <a:r>
+              <a:rPr lang="en-GB" dirty="0"/>
+              <a:t>Still need to fix x and y</a:t>
+            </a:r>
+          </a:p>
+          <a:p>
+            <a:pPr lvl="1"/>
+            <a:r>
+              <a:rPr lang="en-GB" dirty="0"/>
+              <a:t>Fix them based on </a:t>
+            </a:r>
+            <a:r>
+              <a:rPr lang="en-GB" dirty="0" err="1"/>
+              <a:t>FoV</a:t>
+            </a:r>
+            <a:endParaRPr lang="en-GB" dirty="0"/>
+          </a:p>
+          <a:p>
+            <a:pPr lvl="1"/>
+            <a:r>
+              <a:rPr lang="en-GB" dirty="0"/>
+              <a:t>For a particular </a:t>
+            </a:r>
+            <a:r>
+              <a:rPr lang="en-GB" dirty="0" err="1"/>
+              <a:t>FoV</a:t>
+            </a:r>
+            <a:r>
+              <a:rPr lang="en-GB" dirty="0"/>
+              <a:t>, find the behaviour for different x and y values</a:t>
+            </a:r>
+          </a:p>
+          <a:p>
+            <a:pPr lvl="1"/>
+            <a:r>
+              <a:rPr lang="en-GB" dirty="0"/>
+              <a:t>Average this behaviour to find the behaviour for this </a:t>
+            </a:r>
+            <a:r>
+              <a:rPr lang="en-GB" dirty="0" err="1"/>
+              <a:t>FoV</a:t>
+            </a:r>
+            <a:endParaRPr lang="en-GB" dirty="0"/>
+          </a:p>
+        </p:txBody>
+      </p:sp>
+    </p:spTree>
+    <p:extLst>
+      <p:ext uri="{BB962C8B-B14F-4D97-AF65-F5344CB8AC3E}">
+        <p14:creationId xmlns:p14="http://schemas.microsoft.com/office/powerpoint/2010/main" val="1470631209"/>
+      </p:ext>
+    </p:extLst>
+  </p:cSld>
+  <p:clrMapOvr>
+    <a:masterClrMapping/>
+  </p:clrMapOvr>
+</p:sld>
+</file>
+
+<file path=ppt/slides/slide11.xml><?xml version="1.0" encoding="utf-8"?>
+<p:sld xmlns:a="http://schemas.openxmlformats.org/drawingml/2006/main" xmlns:r="http://schemas.openxmlformats.org/officeDocument/2006/relationships" xmlns:p="http://schemas.openxmlformats.org/presentationml/2006/main">
+  <p:cSld>
+    <p:spTree>
+      <p:nvGrpSpPr>
+        <p:cNvPr id="1" name=""/>
+        <p:cNvGrpSpPr/>
+        <p:nvPr/>
+      </p:nvGrpSpPr>
+      <p:grpSpPr>
+        <a:xfrm>
+          <a:off x="0" y="0"/>
+          <a:ext cx="0" cy="0"/>
+          <a:chOff x="0" y="0"/>
+          <a:chExt cx="0" cy="0"/>
+        </a:xfrm>
+      </p:grpSpPr>
+      <p:sp>
+        <p:nvSpPr>
+          <p:cNvPr id="2" name="Title 1">
+            <a:extLst>
+              <a:ext uri="{FF2B5EF4-FFF2-40B4-BE49-F238E27FC236}">
+                <a16:creationId xmlns:a16="http://schemas.microsoft.com/office/drawing/2014/main" id="{53E40709-EF72-3ED9-A756-013935985EFE}"/>
+              </a:ext>
+            </a:extLst>
+          </p:cNvPr>
+          <p:cNvSpPr>
+            <a:spLocks noGrp="1"/>
+          </p:cNvSpPr>
+          <p:nvPr>
+            <p:ph type="title"/>
+          </p:nvPr>
+        </p:nvSpPr>
+        <p:spPr/>
+        <p:txBody>
+          <a:bodyPr/>
+          <a:lstStyle/>
+          <a:p>
+            <a:r>
+              <a:rPr lang="en-GB" dirty="0"/>
+              <a:t>Changes in elevation angle</a:t>
+            </a:r>
+          </a:p>
+        </p:txBody>
+      </p:sp>
+      <p:pic>
+        <p:nvPicPr>
+          <p:cNvPr id="5" name="Content Placeholder 4" descr="A graph of different colored lines&#10;&#10;Description automatically generated">
+            <a:extLst>
+              <a:ext uri="{FF2B5EF4-FFF2-40B4-BE49-F238E27FC236}">
+                <a16:creationId xmlns:a16="http://schemas.microsoft.com/office/drawing/2014/main" id="{BF43811D-4CA9-61A1-ED98-74E4C8F44D8C}"/>
+              </a:ext>
+            </a:extLst>
+          </p:cNvPr>
+          <p:cNvPicPr>
+            <a:picLocks noGrp="1" noChangeAspect="1"/>
+          </p:cNvPicPr>
+          <p:nvPr>
+            <p:ph idx="1"/>
+          </p:nvPr>
+        </p:nvPicPr>
+        <p:blipFill>
+          <a:blip r:embed="rId2">
+            <a:extLst>
+              <a:ext uri="{28A0092B-C50C-407E-A947-70E740481C1C}">
+                <a14:useLocalDpi xmlns:a14="http://schemas.microsoft.com/office/drawing/2010/main" val="0"/>
+              </a:ext>
+            </a:extLst>
+          </a:blip>
+          <a:stretch>
+            <a:fillRect/>
+          </a:stretch>
+        </p:blipFill>
+        <p:spPr>
+          <a:xfrm>
+            <a:off x="144917" y="1346402"/>
+            <a:ext cx="5852172" cy="4389129"/>
+          </a:xfrm>
+        </p:spPr>
+      </p:pic>
+      <p:pic>
+        <p:nvPicPr>
+          <p:cNvPr id="7" name="Picture 6">
+            <a:extLst>
+              <a:ext uri="{FF2B5EF4-FFF2-40B4-BE49-F238E27FC236}">
+                <a16:creationId xmlns:a16="http://schemas.microsoft.com/office/drawing/2014/main" id="{A3554DCB-5417-EA1E-0B73-A3BA693C381D}"/>
+              </a:ext>
+            </a:extLst>
+          </p:cNvPr>
+          <p:cNvPicPr>
+            <a:picLocks noChangeAspect="1"/>
+          </p:cNvPicPr>
+          <p:nvPr/>
+        </p:nvPicPr>
+        <p:blipFill>
+          <a:blip r:embed="rId3">
+            <a:extLst>
+              <a:ext uri="{28A0092B-C50C-407E-A947-70E740481C1C}">
+                <a14:useLocalDpi xmlns:a14="http://schemas.microsoft.com/office/drawing/2010/main" val="0"/>
+              </a:ext>
+            </a:extLst>
+          </a:blip>
+          <a:srcRect/>
+          <a:stretch/>
+        </p:blipFill>
+        <p:spPr>
+          <a:xfrm>
+            <a:off x="5997089" y="1346402"/>
+            <a:ext cx="5852172" cy="4389129"/>
+          </a:xfrm>
+          <a:prstGeom prst="rect">
+            <a:avLst/>
+          </a:prstGeom>
+        </p:spPr>
+      </p:pic>
+    </p:spTree>
+    <p:extLst>
+      <p:ext uri="{BB962C8B-B14F-4D97-AF65-F5344CB8AC3E}">
+        <p14:creationId xmlns:p14="http://schemas.microsoft.com/office/powerpoint/2010/main" val="2983568889"/>
+      </p:ext>
+    </p:extLst>
+  </p:cSld>
+  <p:clrMapOvr>
+    <a:masterClrMapping/>
+  </p:clrMapOvr>
+</p:sld>
+</file>
+
+<file path=ppt/slides/slide12.xml><?xml version="1.0" encoding="utf-8"?>
+<p:sld xmlns:a="http://schemas.openxmlformats.org/drawingml/2006/main" xmlns:r="http://schemas.openxmlformats.org/officeDocument/2006/relationships" xmlns:p="http://schemas.openxmlformats.org/presentationml/2006/main">
+  <p:cSld>
+    <p:spTree>
+      <p:nvGrpSpPr>
+        <p:cNvPr id="1" name=""/>
+        <p:cNvGrpSpPr/>
+        <p:nvPr/>
+      </p:nvGrpSpPr>
+      <p:grpSpPr>
+        <a:xfrm>
+          <a:off x="0" y="0"/>
+          <a:ext cx="0" cy="0"/>
+          <a:chOff x="0" y="0"/>
+          <a:chExt cx="0" cy="0"/>
+        </a:xfrm>
+      </p:grpSpPr>
+      <p:sp>
+        <p:nvSpPr>
+          <p:cNvPr id="2" name="Title 1">
+            <a:extLst>
+              <a:ext uri="{FF2B5EF4-FFF2-40B4-BE49-F238E27FC236}">
+                <a16:creationId xmlns:a16="http://schemas.microsoft.com/office/drawing/2014/main" id="{04AF809B-E1DD-09F0-7253-CE318852581B}"/>
+              </a:ext>
+            </a:extLst>
+          </p:cNvPr>
+          <p:cNvSpPr>
+            <a:spLocks noGrp="1"/>
+          </p:cNvSpPr>
+          <p:nvPr>
+            <p:ph type="title"/>
+          </p:nvPr>
+        </p:nvSpPr>
+        <p:spPr/>
+        <p:txBody>
+          <a:bodyPr/>
+          <a:lstStyle/>
+          <a:p>
+            <a:r>
+              <a:rPr lang="en-GB" dirty="0"/>
+              <a:t>Changes in azimuth angle</a:t>
+            </a:r>
+          </a:p>
+        </p:txBody>
+      </p:sp>
+      <p:pic>
+        <p:nvPicPr>
+          <p:cNvPr id="5" name="Content Placeholder 4" descr="A graph of different colored lines&#10;&#10;Description automatically generated">
+            <a:extLst>
+              <a:ext uri="{FF2B5EF4-FFF2-40B4-BE49-F238E27FC236}">
+                <a16:creationId xmlns:a16="http://schemas.microsoft.com/office/drawing/2014/main" id="{4AAC5DCB-87CC-9515-868A-AD1997ED18DA}"/>
+              </a:ext>
+            </a:extLst>
+          </p:cNvPr>
+          <p:cNvPicPr>
+            <a:picLocks noGrp="1" noChangeAspect="1"/>
+          </p:cNvPicPr>
+          <p:nvPr>
+            <p:ph idx="1"/>
+          </p:nvPr>
+        </p:nvPicPr>
+        <p:blipFill>
+          <a:blip r:embed="rId2">
+            <a:extLst>
+              <a:ext uri="{28A0092B-C50C-407E-A947-70E740481C1C}">
+                <a14:useLocalDpi xmlns:a14="http://schemas.microsoft.com/office/drawing/2010/main" val="0"/>
+              </a:ext>
+            </a:extLst>
+          </a:blip>
+          <a:stretch>
+            <a:fillRect/>
+          </a:stretch>
+        </p:blipFill>
+        <p:spPr>
+          <a:xfrm>
+            <a:off x="214361" y="1346354"/>
+            <a:ext cx="5733834" cy="4300376"/>
+          </a:xfrm>
+        </p:spPr>
+      </p:pic>
+      <p:pic>
+        <p:nvPicPr>
+          <p:cNvPr id="4" name="Picture 3">
+            <a:extLst>
+              <a:ext uri="{FF2B5EF4-FFF2-40B4-BE49-F238E27FC236}">
+                <a16:creationId xmlns:a16="http://schemas.microsoft.com/office/drawing/2014/main" id="{A581792F-E698-B13C-6099-4A4207C50F49}"/>
+              </a:ext>
+            </a:extLst>
+          </p:cNvPr>
+          <p:cNvPicPr>
+            <a:picLocks noChangeAspect="1"/>
+          </p:cNvPicPr>
+          <p:nvPr/>
+        </p:nvPicPr>
+        <p:blipFill>
+          <a:blip r:embed="rId3">
+            <a:extLst>
+              <a:ext uri="{28A0092B-C50C-407E-A947-70E740481C1C}">
+                <a14:useLocalDpi xmlns:a14="http://schemas.microsoft.com/office/drawing/2010/main" val="0"/>
+              </a:ext>
+            </a:extLst>
+          </a:blip>
+          <a:srcRect/>
+          <a:stretch/>
+        </p:blipFill>
+        <p:spPr>
+          <a:xfrm>
+            <a:off x="5594333" y="1257601"/>
+            <a:ext cx="5852172" cy="4389129"/>
+          </a:xfrm>
+          <a:prstGeom prst="rect">
+            <a:avLst/>
+          </a:prstGeom>
+        </p:spPr>
+      </p:pic>
+    </p:spTree>
+    <p:extLst>
+      <p:ext uri="{BB962C8B-B14F-4D97-AF65-F5344CB8AC3E}">
+        <p14:creationId xmlns:p14="http://schemas.microsoft.com/office/powerpoint/2010/main" val="846814401"/>
+      </p:ext>
+    </p:extLst>
+  </p:cSld>
+  <p:clrMapOvr>
+    <a:masterClrMapping/>
+  </p:clrMapOvr>
+</p:sld>
+</file>
+
+<file path=ppt/slides/slide13.xml><?xml version="1.0" encoding="utf-8"?>
+<p:sld xmlns:a="http://schemas.openxmlformats.org/drawingml/2006/main" xmlns:r="http://schemas.openxmlformats.org/officeDocument/2006/relationships" xmlns:p="http://schemas.openxmlformats.org/presentationml/2006/main">
+  <p:cSld>
+    <p:spTree>
+      <p:nvGrpSpPr>
+        <p:cNvPr id="1" name=""/>
+        <p:cNvGrpSpPr/>
+        <p:nvPr/>
+      </p:nvGrpSpPr>
+      <p:grpSpPr>
+        <a:xfrm>
+          <a:off x="0" y="0"/>
+          <a:ext cx="0" cy="0"/>
+          <a:chOff x="0" y="0"/>
+          <a:chExt cx="0" cy="0"/>
+        </a:xfrm>
+      </p:grpSpPr>
+      <p:sp>
+        <p:nvSpPr>
+          <p:cNvPr id="2" name="Title 1">
+            <a:extLst>
+              <a:ext uri="{FF2B5EF4-FFF2-40B4-BE49-F238E27FC236}">
                 <a16:creationId xmlns:a16="http://schemas.microsoft.com/office/drawing/2014/main" id="{20D47CEC-F2FF-6C32-1D74-09688C50618E}"/>
               </a:ext>
             </a:extLst>
@@ -6711,7 +7107,7 @@
 </p:sld>
 </file>
 
-<file path=ppt/slides/slide11.xml><?xml version="1.0" encoding="utf-8"?>
+<file path=ppt/slides/slide14.xml><?xml version="1.0" encoding="utf-8"?>
 <p:sld xmlns:a="http://schemas.openxmlformats.org/drawingml/2006/main" xmlns:r="http://schemas.openxmlformats.org/officeDocument/2006/relationships" xmlns:p="http://schemas.openxmlformats.org/presentationml/2006/main">
   <p:cSld>
     <p:spTree>
@@ -6840,7 +7236,7 @@
 </p:sld>
 </file>
 
-<file path=ppt/slides/slide12.xml><?xml version="1.0" encoding="utf-8"?>
+<file path=ppt/slides/slide15.xml><?xml version="1.0" encoding="utf-8"?>
 <p:sld xmlns:a="http://schemas.openxmlformats.org/drawingml/2006/main" xmlns:r="http://schemas.openxmlformats.org/officeDocument/2006/relationships" xmlns:p="http://schemas.openxmlformats.org/presentationml/2006/main">
   <p:cSld>
     <p:spTree>
@@ -6938,7 +7334,7 @@
 </p:sld>
 </file>
 
-<file path=ppt/slides/slide13.xml><?xml version="1.0" encoding="utf-8"?>
+<file path=ppt/slides/slide16.xml><?xml version="1.0" encoding="utf-8"?>
 <p:sld xmlns:a="http://schemas.openxmlformats.org/drawingml/2006/main" xmlns:r="http://schemas.openxmlformats.org/officeDocument/2006/relationships" xmlns:p="http://schemas.openxmlformats.org/presentationml/2006/main">
   <p:cSld>
     <p:spTree>
@@ -7030,7 +7426,7 @@
 </p:sld>
 </file>
 
-<file path=ppt/slides/slide14.xml><?xml version="1.0" encoding="utf-8"?>
+<file path=ppt/slides/slide17.xml><?xml version="1.0" encoding="utf-8"?>
 <p:sld xmlns:a="http://schemas.openxmlformats.org/drawingml/2006/main" xmlns:r="http://schemas.openxmlformats.org/officeDocument/2006/relationships" xmlns:p="http://schemas.openxmlformats.org/presentationml/2006/main" show="0">
   <p:cSld>
     <p:spTree>
@@ -7246,7 +7642,7 @@
 </p:sld>
 </file>
 
-<file path=ppt/slides/slide15.xml><?xml version="1.0" encoding="utf-8"?>
+<file path=ppt/slides/slide18.xml><?xml version="1.0" encoding="utf-8"?>
 <p:sld xmlns:a="http://schemas.openxmlformats.org/drawingml/2006/main" xmlns:r="http://schemas.openxmlformats.org/officeDocument/2006/relationships" xmlns:p="http://schemas.openxmlformats.org/presentationml/2006/main" show="0">
   <p:cSld>
     <p:spTree>
@@ -7417,7 +7813,7 @@
 </p:sld>
 </file>
 
-<file path=ppt/slides/slide16.xml><?xml version="1.0" encoding="utf-8"?>
+<file path=ppt/slides/slide19.xml><?xml version="1.0" encoding="utf-8"?>
 <p:sld xmlns:a="http://schemas.openxmlformats.org/drawingml/2006/main" xmlns:r="http://schemas.openxmlformats.org/officeDocument/2006/relationships" xmlns:p="http://schemas.openxmlformats.org/presentationml/2006/main" show="0">
   <p:cSld>
     <p:spTree>
@@ -7673,7 +8069,72 @@
 </p:sld>
 </file>
 
-<file path=ppt/slides/slide17.xml><?xml version="1.0" encoding="utf-8"?>
+<file path=ppt/slides/slide2.xml><?xml version="1.0" encoding="utf-8"?>
+<p:sld xmlns:a="http://schemas.openxmlformats.org/drawingml/2006/main" xmlns:r="http://schemas.openxmlformats.org/officeDocument/2006/relationships" xmlns:p="http://schemas.openxmlformats.org/presentationml/2006/main" show="0">
+  <p:cSld>
+    <p:spTree>
+      <p:nvGrpSpPr>
+        <p:cNvPr id="1" name=""/>
+        <p:cNvGrpSpPr/>
+        <p:nvPr/>
+      </p:nvGrpSpPr>
+      <p:grpSpPr>
+        <a:xfrm>
+          <a:off x="0" y="0"/>
+          <a:ext cx="0" cy="0"/>
+          <a:chOff x="0" y="0"/>
+          <a:chExt cx="0" cy="0"/>
+        </a:xfrm>
+      </p:grpSpPr>
+      <p:pic>
+        <p:nvPicPr>
+          <p:cNvPr id="3" name="Content Placeholder 4" descr="A screen shot of a diagram&#10;&#10;Description automatically generated">
+            <a:extLst>
+              <a:ext uri="{FF2B5EF4-FFF2-40B4-BE49-F238E27FC236}">
+                <a16:creationId xmlns:a16="http://schemas.microsoft.com/office/drawing/2014/main" id="{1ABB36AC-8E53-4110-476B-CF468BCF9FF1}"/>
+              </a:ext>
+            </a:extLst>
+          </p:cNvPr>
+          <p:cNvPicPr>
+            <a:picLocks noChangeAspect="1"/>
+          </p:cNvPicPr>
+          <p:nvPr/>
+        </p:nvPicPr>
+        <p:blipFill rotWithShape="1">
+          <a:blip r:embed="rId2">
+            <a:extLst>
+              <a:ext uri="{28A0092B-C50C-407E-A947-70E740481C1C}">
+                <a14:useLocalDpi xmlns:a14="http://schemas.microsoft.com/office/drawing/2010/main" val="0"/>
+              </a:ext>
+            </a:extLst>
+          </a:blip>
+          <a:srcRect l="27017" r="19493"/>
+          <a:stretch/>
+        </p:blipFill>
+        <p:spPr>
+          <a:xfrm>
+            <a:off x="2027910" y="170415"/>
+            <a:ext cx="5763236" cy="6060623"/>
+          </a:xfrm>
+          <a:prstGeom prst="rect">
+            <a:avLst/>
+          </a:prstGeom>
+        </p:spPr>
+      </p:pic>
+    </p:spTree>
+    <p:extLst>
+      <p:ext uri="{BB962C8B-B14F-4D97-AF65-F5344CB8AC3E}">
+        <p14:creationId xmlns:p14="http://schemas.microsoft.com/office/powerpoint/2010/main" val="2516967828"/>
+      </p:ext>
+    </p:extLst>
+  </p:cSld>
+  <p:clrMapOvr>
+    <a:masterClrMapping/>
+  </p:clrMapOvr>
+</p:sld>
+</file>
+
+<file path=ppt/slides/slide20.xml><?xml version="1.0" encoding="utf-8"?>
 <p:sld xmlns:a="http://schemas.openxmlformats.org/drawingml/2006/main" xmlns:r="http://schemas.openxmlformats.org/officeDocument/2006/relationships" xmlns:p="http://schemas.openxmlformats.org/presentationml/2006/main" show="0">
   <p:cSld>
     <p:spTree>
@@ -8077,7 +8538,7 @@
 </p:sld>
 </file>
 
-<file path=ppt/slides/slide18.xml><?xml version="1.0" encoding="utf-8"?>
+<file path=ppt/slides/slide21.xml><?xml version="1.0" encoding="utf-8"?>
 <p:sld xmlns:a="http://schemas.openxmlformats.org/drawingml/2006/main" xmlns:r="http://schemas.openxmlformats.org/officeDocument/2006/relationships" xmlns:p="http://schemas.openxmlformats.org/presentationml/2006/main" show="0">
   <p:cSld>
     <p:spTree>
@@ -8302,7 +8763,7 @@
 </p:sld>
 </file>
 
-<file path=ppt/slides/slide19.xml><?xml version="1.0" encoding="utf-8"?>
+<file path=ppt/slides/slide22.xml><?xml version="1.0" encoding="utf-8"?>
 <p:sld xmlns:a="http://schemas.openxmlformats.org/drawingml/2006/main" xmlns:r="http://schemas.openxmlformats.org/officeDocument/2006/relationships" xmlns:p="http://schemas.openxmlformats.org/presentationml/2006/main" show="0">
   <p:cSld>
     <p:spTree>
@@ -9142,72 +9603,7 @@
 </p:sld>
 </file>
 
-<file path=ppt/slides/slide2.xml><?xml version="1.0" encoding="utf-8"?>
-<p:sld xmlns:a="http://schemas.openxmlformats.org/drawingml/2006/main" xmlns:r="http://schemas.openxmlformats.org/officeDocument/2006/relationships" xmlns:p="http://schemas.openxmlformats.org/presentationml/2006/main" show="0">
-  <p:cSld>
-    <p:spTree>
-      <p:nvGrpSpPr>
-        <p:cNvPr id="1" name=""/>
-        <p:cNvGrpSpPr/>
-        <p:nvPr/>
-      </p:nvGrpSpPr>
-      <p:grpSpPr>
-        <a:xfrm>
-          <a:off x="0" y="0"/>
-          <a:ext cx="0" cy="0"/>
-          <a:chOff x="0" y="0"/>
-          <a:chExt cx="0" cy="0"/>
-        </a:xfrm>
-      </p:grpSpPr>
-      <p:pic>
-        <p:nvPicPr>
-          <p:cNvPr id="3" name="Content Placeholder 4" descr="A screen shot of a diagram&#10;&#10;Description automatically generated">
-            <a:extLst>
-              <a:ext uri="{FF2B5EF4-FFF2-40B4-BE49-F238E27FC236}">
-                <a16:creationId xmlns:a16="http://schemas.microsoft.com/office/drawing/2014/main" id="{1ABB36AC-8E53-4110-476B-CF468BCF9FF1}"/>
-              </a:ext>
-            </a:extLst>
-          </p:cNvPr>
-          <p:cNvPicPr>
-            <a:picLocks noChangeAspect="1"/>
-          </p:cNvPicPr>
-          <p:nvPr/>
-        </p:nvPicPr>
-        <p:blipFill rotWithShape="1">
-          <a:blip r:embed="rId2">
-            <a:extLst>
-              <a:ext uri="{28A0092B-C50C-407E-A947-70E740481C1C}">
-                <a14:useLocalDpi xmlns:a14="http://schemas.microsoft.com/office/drawing/2010/main" val="0"/>
-              </a:ext>
-            </a:extLst>
-          </a:blip>
-          <a:srcRect l="27017" r="19493"/>
-          <a:stretch/>
-        </p:blipFill>
-        <p:spPr>
-          <a:xfrm>
-            <a:off x="2027910" y="170415"/>
-            <a:ext cx="5763236" cy="6060623"/>
-          </a:xfrm>
-          <a:prstGeom prst="rect">
-            <a:avLst/>
-          </a:prstGeom>
-        </p:spPr>
-      </p:pic>
-    </p:spTree>
-    <p:extLst>
-      <p:ext uri="{BB962C8B-B14F-4D97-AF65-F5344CB8AC3E}">
-        <p14:creationId xmlns:p14="http://schemas.microsoft.com/office/powerpoint/2010/main" val="2516967828"/>
-      </p:ext>
-    </p:extLst>
-  </p:cSld>
-  <p:clrMapOvr>
-    <a:masterClrMapping/>
-  </p:clrMapOvr>
-</p:sld>
-</file>
-
-<file path=ppt/slides/slide20.xml><?xml version="1.0" encoding="utf-8"?>
+<file path=ppt/slides/slide23.xml><?xml version="1.0" encoding="utf-8"?>
 <p:sld xmlns:a="http://schemas.openxmlformats.org/drawingml/2006/main" xmlns:r="http://schemas.openxmlformats.org/officeDocument/2006/relationships" xmlns:p="http://schemas.openxmlformats.org/presentationml/2006/main" show="0">
   <p:cSld>
     <p:spTree>
@@ -9565,7 +9961,7 @@
 </p:sld>
 </file>
 
-<file path=ppt/slides/slide21.xml><?xml version="1.0" encoding="utf-8"?>
+<file path=ppt/slides/slide24.xml><?xml version="1.0" encoding="utf-8"?>
 <p:sld xmlns:a="http://schemas.openxmlformats.org/drawingml/2006/main" xmlns:r="http://schemas.openxmlformats.org/officeDocument/2006/relationships" xmlns:p="http://schemas.openxmlformats.org/presentationml/2006/main" show="0">
   <p:cSld>
     <p:spTree>
@@ -9820,7 +10216,7 @@
 </p:sld>
 </file>
 
-<file path=ppt/slides/slide22.xml><?xml version="1.0" encoding="utf-8"?>
+<file path=ppt/slides/slide25.xml><?xml version="1.0" encoding="utf-8"?>
 <p:sld xmlns:a="http://schemas.openxmlformats.org/drawingml/2006/main" xmlns:r="http://schemas.openxmlformats.org/officeDocument/2006/relationships" xmlns:p="http://schemas.openxmlformats.org/presentationml/2006/main" show="0">
   <p:cSld>
     <p:spTree>
@@ -10017,7 +10413,7 @@
 </p:sld>
 </file>
 
-<file path=ppt/slides/slide23.xml><?xml version="1.0" encoding="utf-8"?>
+<file path=ppt/slides/slide26.xml><?xml version="1.0" encoding="utf-8"?>
 <p:sld xmlns:a="http://schemas.openxmlformats.org/drawingml/2006/main" xmlns:r="http://schemas.openxmlformats.org/officeDocument/2006/relationships" xmlns:p="http://schemas.openxmlformats.org/presentationml/2006/main" show="0">
   <p:cSld>
     <p:spTree>
@@ -10225,7 +10621,7 @@
 </p:sld>
 </file>
 
-<file path=ppt/slides/slide24.xml><?xml version="1.0" encoding="utf-8"?>
+<file path=ppt/slides/slide27.xml><?xml version="1.0" encoding="utf-8"?>
 <p:sld xmlns:a="http://schemas.openxmlformats.org/drawingml/2006/main" xmlns:r="http://schemas.openxmlformats.org/officeDocument/2006/relationships" xmlns:p="http://schemas.openxmlformats.org/presentationml/2006/main" show="0">
   <p:cSld>
     <p:spTree>
@@ -10338,7 +10734,7 @@
 </p:sld>
 </file>
 
-<file path=ppt/slides/slide25.xml><?xml version="1.0" encoding="utf-8"?>
+<file path=ppt/slides/slide28.xml><?xml version="1.0" encoding="utf-8"?>
 <p:sld xmlns:a="http://schemas.openxmlformats.org/drawingml/2006/main" xmlns:r="http://schemas.openxmlformats.org/officeDocument/2006/relationships" xmlns:p="http://schemas.openxmlformats.org/presentationml/2006/main" show="0">
   <p:cSld>
     <p:spTree>
@@ -10432,7 +10828,7 @@
 </p:sld>
 </file>
 
-<file path=ppt/slides/slide26.xml><?xml version="1.0" encoding="utf-8"?>
+<file path=ppt/slides/slide29.xml><?xml version="1.0" encoding="utf-8"?>
 <p:sld xmlns:a="http://schemas.openxmlformats.org/drawingml/2006/main" xmlns:r="http://schemas.openxmlformats.org/officeDocument/2006/relationships" xmlns:p="http://schemas.openxmlformats.org/presentationml/2006/main" show="0">
   <p:cSld>
     <p:spTree>
@@ -10528,7 +10924,7 @@
 </p:sld>
 </file>
 
-<file path=ppt/slides/slide27.xml><?xml version="1.0" encoding="utf-8"?>
+<file path=ppt/slides/slide3.xml><?xml version="1.0" encoding="utf-8"?>
 <p:sld xmlns:a="http://schemas.openxmlformats.org/drawingml/2006/main" xmlns:r="http://schemas.openxmlformats.org/officeDocument/2006/relationships" xmlns:p="http://schemas.openxmlformats.org/presentationml/2006/main" show="0">
   <p:cSld>
     <p:spTree>
@@ -10550,6 +10946,272 @@
           <p:cNvPr id="2" name="Title 1">
             <a:extLst>
               <a:ext uri="{FF2B5EF4-FFF2-40B4-BE49-F238E27FC236}">
+                <a16:creationId xmlns:a16="http://schemas.microsoft.com/office/drawing/2014/main" id="{188D612F-DF02-F48F-15B8-DCB56D9A64F9}"/>
+              </a:ext>
+            </a:extLst>
+          </p:cNvPr>
+          <p:cNvSpPr>
+            <a:spLocks noGrp="1"/>
+          </p:cNvSpPr>
+          <p:nvPr>
+            <p:ph type="title"/>
+          </p:nvPr>
+        </p:nvSpPr>
+        <p:spPr/>
+        <p:txBody>
+          <a:bodyPr/>
+          <a:lstStyle/>
+          <a:p>
+            <a:r>
+              <a:rPr lang="en-US" dirty="0"/>
+              <a:t>Research questions</a:t>
+            </a:r>
+          </a:p>
+        </p:txBody>
+      </p:sp>
+      <p:sp>
+        <p:nvSpPr>
+          <p:cNvPr id="3" name="Content Placeholder 2">
+            <a:extLst>
+              <a:ext uri="{FF2B5EF4-FFF2-40B4-BE49-F238E27FC236}">
+                <a16:creationId xmlns:a16="http://schemas.microsoft.com/office/drawing/2014/main" id="{1F278D55-3E0F-40EE-F8ED-17FAA00AAA01}"/>
+              </a:ext>
+            </a:extLst>
+          </p:cNvPr>
+          <p:cNvSpPr>
+            <a:spLocks noGrp="1"/>
+          </p:cNvSpPr>
+          <p:nvPr>
+            <p:ph idx="1"/>
+          </p:nvPr>
+        </p:nvSpPr>
+        <p:spPr>
+          <a:xfrm>
+            <a:off x="677334" y="2160589"/>
+            <a:ext cx="9431400" cy="4697411"/>
+          </a:xfrm>
+        </p:spPr>
+        <p:txBody>
+          <a:bodyPr/>
+          <a:lstStyle/>
+          <a:p>
+            <a:r>
+              <a:rPr lang="en-GB" dirty="0"/>
+              <a:t>What is the main impact of changing field of view on the performance of helicopter pilots when using VR for visual cueing.</a:t>
+            </a:r>
+          </a:p>
+          <a:p>
+            <a:pPr lvl="1" fontAlgn="base">
+              <a:spcBef>
+                <a:spcPts val="0"/>
+              </a:spcBef>
+              <a:buFont typeface="+mj-lt"/>
+              <a:buAutoNum type="arabicPeriod"/>
+            </a:pPr>
+            <a:r>
+              <a:rPr lang="en-GB" b="0" i="0" u="none" strike="noStrike" dirty="0">
+                <a:solidFill>
+                  <a:srgbClr val="000000"/>
+                </a:solidFill>
+                <a:effectLst/>
+                <a:latin typeface="Arial" panose="020B0604020202020204" pitchFamily="34" charset="0"/>
+              </a:rPr>
+              <a:t>What manoeuvre is most impacted by changing field of view?</a:t>
+            </a:r>
+          </a:p>
+          <a:p>
+            <a:pPr lvl="1" fontAlgn="base">
+              <a:spcBef>
+                <a:spcPts val="0"/>
+              </a:spcBef>
+              <a:buFont typeface="+mj-lt"/>
+              <a:buAutoNum type="arabicPeriod"/>
+            </a:pPr>
+            <a:r>
+              <a:rPr lang="en-GB" b="0" i="0" u="none" strike="noStrike" dirty="0">
+                <a:solidFill>
+                  <a:srgbClr val="000000"/>
+                </a:solidFill>
+                <a:effectLst/>
+                <a:latin typeface="Arial" panose="020B0604020202020204" pitchFamily="34" charset="0"/>
+              </a:rPr>
+              <a:t>What is the predicted pilot behaviour for the critical manoeuvre with changing </a:t>
+            </a:r>
+            <a:r>
+              <a:rPr lang="en-GB" b="0" i="0" u="none" strike="noStrike" dirty="0" err="1">
+                <a:solidFill>
+                  <a:srgbClr val="000000"/>
+                </a:solidFill>
+                <a:effectLst/>
+                <a:latin typeface="Arial" panose="020B0604020202020204" pitchFamily="34" charset="0"/>
+              </a:rPr>
+              <a:t>FoV</a:t>
+            </a:r>
+            <a:r>
+              <a:rPr lang="en-GB" b="0" i="0" u="none" strike="noStrike" dirty="0">
+                <a:solidFill>
+                  <a:srgbClr val="000000"/>
+                </a:solidFill>
+                <a:effectLst/>
+                <a:latin typeface="Arial" panose="020B0604020202020204" pitchFamily="34" charset="0"/>
+              </a:rPr>
+              <a:t>?</a:t>
+            </a:r>
+          </a:p>
+          <a:p>
+            <a:pPr lvl="1" fontAlgn="base">
+              <a:spcBef>
+                <a:spcPts val="0"/>
+              </a:spcBef>
+              <a:buFont typeface="+mj-lt"/>
+              <a:buAutoNum type="arabicPeriod"/>
+            </a:pPr>
+            <a:r>
+              <a:rPr lang="en-GB" b="0" i="0" u="none" strike="noStrike" dirty="0">
+                <a:solidFill>
+                  <a:srgbClr val="000000"/>
+                </a:solidFill>
+                <a:effectLst/>
+                <a:latin typeface="Arial" panose="020B0604020202020204" pitchFamily="34" charset="0"/>
+              </a:rPr>
+              <a:t>What is the actual pilot behaviour for the critical manoeuvre with changing </a:t>
+            </a:r>
+            <a:r>
+              <a:rPr lang="en-GB" b="0" i="0" u="none" strike="noStrike" dirty="0" err="1">
+                <a:solidFill>
+                  <a:srgbClr val="000000"/>
+                </a:solidFill>
+                <a:effectLst/>
+                <a:latin typeface="Arial" panose="020B0604020202020204" pitchFamily="34" charset="0"/>
+              </a:rPr>
+              <a:t>FoV</a:t>
+            </a:r>
+            <a:r>
+              <a:rPr lang="en-GB" b="0" i="0" u="none" strike="noStrike" dirty="0">
+                <a:solidFill>
+                  <a:srgbClr val="000000"/>
+                </a:solidFill>
+                <a:effectLst/>
+                <a:latin typeface="Arial" panose="020B0604020202020204" pitchFamily="34" charset="0"/>
+              </a:rPr>
+              <a:t>?</a:t>
+            </a:r>
+          </a:p>
+          <a:p>
+            <a:pPr lvl="1" fontAlgn="base">
+              <a:spcBef>
+                <a:spcPts val="0"/>
+              </a:spcBef>
+              <a:buFont typeface="+mj-lt"/>
+              <a:buAutoNum type="arabicPeriod"/>
+            </a:pPr>
+            <a:r>
+              <a:rPr lang="en-GB" b="0" i="0" u="none" strike="noStrike" dirty="0">
+                <a:solidFill>
+                  <a:srgbClr val="000000"/>
+                </a:solidFill>
+                <a:effectLst/>
+                <a:latin typeface="Arial" panose="020B0604020202020204" pitchFamily="34" charset="0"/>
+              </a:rPr>
+              <a:t>What is the effect of changing </a:t>
+            </a:r>
+            <a:r>
+              <a:rPr lang="en-GB" b="0" i="0" u="none" strike="noStrike" dirty="0" err="1">
+                <a:solidFill>
+                  <a:srgbClr val="000000"/>
+                </a:solidFill>
+                <a:effectLst/>
+                <a:latin typeface="Arial" panose="020B0604020202020204" pitchFamily="34" charset="0"/>
+              </a:rPr>
+              <a:t>FoV</a:t>
+            </a:r>
+            <a:r>
+              <a:rPr lang="en-GB" b="0" i="0" u="none" strike="noStrike" dirty="0">
+                <a:solidFill>
+                  <a:srgbClr val="000000"/>
+                </a:solidFill>
+                <a:effectLst/>
+                <a:latin typeface="Arial" panose="020B0604020202020204" pitchFamily="34" charset="0"/>
+              </a:rPr>
+              <a:t> on pilot performance?</a:t>
+            </a:r>
+          </a:p>
+          <a:p>
+            <a:pPr lvl="1" fontAlgn="base">
+              <a:spcBef>
+                <a:spcPts val="0"/>
+              </a:spcBef>
+              <a:buFont typeface="+mj-lt"/>
+              <a:buAutoNum type="arabicPeriod"/>
+            </a:pPr>
+            <a:r>
+              <a:rPr lang="en-GB" b="0" i="0" u="none" strike="noStrike" dirty="0">
+                <a:solidFill>
+                  <a:srgbClr val="000000"/>
+                </a:solidFill>
+                <a:effectLst/>
+                <a:latin typeface="Arial" panose="020B0604020202020204" pitchFamily="34" charset="0"/>
+              </a:rPr>
+              <a:t>What strategies do pilots employ to overcome adverse effects of changing </a:t>
+            </a:r>
+            <a:r>
+              <a:rPr lang="en-GB" b="0" i="0" u="none" strike="noStrike" dirty="0" err="1">
+                <a:solidFill>
+                  <a:srgbClr val="000000"/>
+                </a:solidFill>
+                <a:effectLst/>
+                <a:latin typeface="Arial" panose="020B0604020202020204" pitchFamily="34" charset="0"/>
+              </a:rPr>
+              <a:t>FoV</a:t>
+            </a:r>
+            <a:r>
+              <a:rPr lang="en-GB" b="0" i="0" u="none" strike="noStrike" dirty="0">
+                <a:solidFill>
+                  <a:srgbClr val="000000"/>
+                </a:solidFill>
+                <a:effectLst/>
+                <a:latin typeface="Arial" panose="020B0604020202020204" pitchFamily="34" charset="0"/>
+              </a:rPr>
+              <a:t>?</a:t>
+            </a:r>
+          </a:p>
+        </p:txBody>
+      </p:sp>
+    </p:spTree>
+    <p:extLst>
+      <p:ext uri="{BB962C8B-B14F-4D97-AF65-F5344CB8AC3E}">
+        <p14:creationId xmlns:p14="http://schemas.microsoft.com/office/powerpoint/2010/main" val="3732091581"/>
+      </p:ext>
+    </p:extLst>
+  </p:cSld>
+  <p:clrMapOvr>
+    <a:masterClrMapping/>
+  </p:clrMapOvr>
+</p:sld>
+</file>
+
+<file path=ppt/slides/slide30.xml><?xml version="1.0" encoding="utf-8"?>
+<p:sld xmlns:a="http://schemas.openxmlformats.org/drawingml/2006/main" xmlns:r="http://schemas.openxmlformats.org/officeDocument/2006/relationships" xmlns:p="http://schemas.openxmlformats.org/presentationml/2006/main" show="0">
+  <p:cSld>
+    <p:spTree>
+      <p:nvGrpSpPr>
+        <p:cNvPr id="1" name=""/>
+        <p:cNvGrpSpPr/>
+        <p:nvPr/>
+      </p:nvGrpSpPr>
+      <p:grpSpPr>
+        <a:xfrm>
+          <a:off x="0" y="0"/>
+          <a:ext cx="0" cy="0"/>
+          <a:chOff x="0" y="0"/>
+          <a:chExt cx="0" cy="0"/>
+        </a:xfrm>
+      </p:grpSpPr>
+      <p:sp>
+        <p:nvSpPr>
+          <p:cNvPr id="2" name="Title 1">
+            <a:extLst>
+              <a:ext uri="{FF2B5EF4-FFF2-40B4-BE49-F238E27FC236}">
                 <a16:creationId xmlns:a16="http://schemas.microsoft.com/office/drawing/2014/main" id="{6637BD43-6062-8C37-FCB4-4EB78695356F}"/>
               </a:ext>
             </a:extLst>
@@ -10636,7 +11298,7 @@
 </p:sld>
 </file>
 
-<file path=ppt/slides/slide28.xml><?xml version="1.0" encoding="utf-8"?>
+<file path=ppt/slides/slide31.xml><?xml version="1.0" encoding="utf-8"?>
 <p:sld xmlns:a="http://schemas.openxmlformats.org/drawingml/2006/main" xmlns:r="http://schemas.openxmlformats.org/officeDocument/2006/relationships" xmlns:p="http://schemas.openxmlformats.org/presentationml/2006/main" show="0">
   <p:cSld>
     <p:spTree>
@@ -10726,7 +11388,7 @@
 </p:sld>
 </file>
 
-<file path=ppt/slides/slide29.xml><?xml version="1.0" encoding="utf-8"?>
+<file path=ppt/slides/slide32.xml><?xml version="1.0" encoding="utf-8"?>
 <p:sld xmlns:a="http://schemas.openxmlformats.org/drawingml/2006/main" xmlns:r="http://schemas.openxmlformats.org/officeDocument/2006/relationships" xmlns:p="http://schemas.openxmlformats.org/presentationml/2006/main" show="0">
   <p:cSld>
     <p:spTree>
@@ -10983,273 +11645,7 @@
 </p:sld>
 </file>
 
-<file path=ppt/slides/slide3.xml><?xml version="1.0" encoding="utf-8"?>
-<p:sld xmlns:a="http://schemas.openxmlformats.org/drawingml/2006/main" xmlns:r="http://schemas.openxmlformats.org/officeDocument/2006/relationships" xmlns:p="http://schemas.openxmlformats.org/presentationml/2006/main" show="0">
-  <p:cSld>
-    <p:spTree>
-      <p:nvGrpSpPr>
-        <p:cNvPr id="1" name=""/>
-        <p:cNvGrpSpPr/>
-        <p:nvPr/>
-      </p:nvGrpSpPr>
-      <p:grpSpPr>
-        <a:xfrm>
-          <a:off x="0" y="0"/>
-          <a:ext cx="0" cy="0"/>
-          <a:chOff x="0" y="0"/>
-          <a:chExt cx="0" cy="0"/>
-        </a:xfrm>
-      </p:grpSpPr>
-      <p:sp>
-        <p:nvSpPr>
-          <p:cNvPr id="2" name="Title 1">
-            <a:extLst>
-              <a:ext uri="{FF2B5EF4-FFF2-40B4-BE49-F238E27FC236}">
-                <a16:creationId xmlns:a16="http://schemas.microsoft.com/office/drawing/2014/main" id="{188D612F-DF02-F48F-15B8-DCB56D9A64F9}"/>
-              </a:ext>
-            </a:extLst>
-          </p:cNvPr>
-          <p:cNvSpPr>
-            <a:spLocks noGrp="1"/>
-          </p:cNvSpPr>
-          <p:nvPr>
-            <p:ph type="title"/>
-          </p:nvPr>
-        </p:nvSpPr>
-        <p:spPr/>
-        <p:txBody>
-          <a:bodyPr/>
-          <a:lstStyle/>
-          <a:p>
-            <a:r>
-              <a:rPr lang="en-US" dirty="0"/>
-              <a:t>Research questions</a:t>
-            </a:r>
-          </a:p>
-        </p:txBody>
-      </p:sp>
-      <p:sp>
-        <p:nvSpPr>
-          <p:cNvPr id="3" name="Content Placeholder 2">
-            <a:extLst>
-              <a:ext uri="{FF2B5EF4-FFF2-40B4-BE49-F238E27FC236}">
-                <a16:creationId xmlns:a16="http://schemas.microsoft.com/office/drawing/2014/main" id="{1F278D55-3E0F-40EE-F8ED-17FAA00AAA01}"/>
-              </a:ext>
-            </a:extLst>
-          </p:cNvPr>
-          <p:cNvSpPr>
-            <a:spLocks noGrp="1"/>
-          </p:cNvSpPr>
-          <p:nvPr>
-            <p:ph idx="1"/>
-          </p:nvPr>
-        </p:nvSpPr>
-        <p:spPr>
-          <a:xfrm>
-            <a:off x="677334" y="2160589"/>
-            <a:ext cx="9431400" cy="4697411"/>
-          </a:xfrm>
-        </p:spPr>
-        <p:txBody>
-          <a:bodyPr/>
-          <a:lstStyle/>
-          <a:p>
-            <a:r>
-              <a:rPr lang="en-GB" dirty="0"/>
-              <a:t>What is the main impact of changing field of view on the performance of helicopter pilots when using VR for visual cueing.</a:t>
-            </a:r>
-          </a:p>
-          <a:p>
-            <a:pPr lvl="1" fontAlgn="base">
-              <a:spcBef>
-                <a:spcPts val="0"/>
-              </a:spcBef>
-              <a:buFont typeface="+mj-lt"/>
-              <a:buAutoNum type="arabicPeriod"/>
-            </a:pPr>
-            <a:r>
-              <a:rPr lang="en-GB" b="0" i="0" u="none" strike="noStrike" dirty="0">
-                <a:solidFill>
-                  <a:srgbClr val="000000"/>
-                </a:solidFill>
-                <a:effectLst/>
-                <a:latin typeface="Arial" panose="020B0604020202020204" pitchFamily="34" charset="0"/>
-              </a:rPr>
-              <a:t>What manoeuvre is most impacted by changing field of view?</a:t>
-            </a:r>
-          </a:p>
-          <a:p>
-            <a:pPr lvl="1" fontAlgn="base">
-              <a:spcBef>
-                <a:spcPts val="0"/>
-              </a:spcBef>
-              <a:buFont typeface="+mj-lt"/>
-              <a:buAutoNum type="arabicPeriod"/>
-            </a:pPr>
-            <a:r>
-              <a:rPr lang="en-GB" b="0" i="0" u="none" strike="noStrike" dirty="0">
-                <a:solidFill>
-                  <a:srgbClr val="000000"/>
-                </a:solidFill>
-                <a:effectLst/>
-                <a:latin typeface="Arial" panose="020B0604020202020204" pitchFamily="34" charset="0"/>
-              </a:rPr>
-              <a:t>What is the predicted pilot behaviour for the critical manoeuvre with changing </a:t>
-            </a:r>
-            <a:r>
-              <a:rPr lang="en-GB" b="0" i="0" u="none" strike="noStrike" dirty="0" err="1">
-                <a:solidFill>
-                  <a:srgbClr val="000000"/>
-                </a:solidFill>
-                <a:effectLst/>
-                <a:latin typeface="Arial" panose="020B0604020202020204" pitchFamily="34" charset="0"/>
-              </a:rPr>
-              <a:t>FoV</a:t>
-            </a:r>
-            <a:r>
-              <a:rPr lang="en-GB" b="0" i="0" u="none" strike="noStrike" dirty="0">
-                <a:solidFill>
-                  <a:srgbClr val="000000"/>
-                </a:solidFill>
-                <a:effectLst/>
-                <a:latin typeface="Arial" panose="020B0604020202020204" pitchFamily="34" charset="0"/>
-              </a:rPr>
-              <a:t>?</a:t>
-            </a:r>
-          </a:p>
-          <a:p>
-            <a:pPr lvl="1" fontAlgn="base">
-              <a:spcBef>
-                <a:spcPts val="0"/>
-              </a:spcBef>
-              <a:buFont typeface="+mj-lt"/>
-              <a:buAutoNum type="arabicPeriod"/>
-            </a:pPr>
-            <a:r>
-              <a:rPr lang="en-GB" b="0" i="0" u="none" strike="noStrike" dirty="0">
-                <a:solidFill>
-                  <a:srgbClr val="000000"/>
-                </a:solidFill>
-                <a:effectLst/>
-                <a:latin typeface="Arial" panose="020B0604020202020204" pitchFamily="34" charset="0"/>
-              </a:rPr>
-              <a:t>What is the actual pilot behaviour for the critical manoeuvre with changing </a:t>
-            </a:r>
-            <a:r>
-              <a:rPr lang="en-GB" b="0" i="0" u="none" strike="noStrike" dirty="0" err="1">
-                <a:solidFill>
-                  <a:srgbClr val="000000"/>
-                </a:solidFill>
-                <a:effectLst/>
-                <a:latin typeface="Arial" panose="020B0604020202020204" pitchFamily="34" charset="0"/>
-              </a:rPr>
-              <a:t>FoV</a:t>
-            </a:r>
-            <a:r>
-              <a:rPr lang="en-GB" b="0" i="0" u="none" strike="noStrike" dirty="0">
-                <a:solidFill>
-                  <a:srgbClr val="000000"/>
-                </a:solidFill>
-                <a:effectLst/>
-                <a:latin typeface="Arial" panose="020B0604020202020204" pitchFamily="34" charset="0"/>
-              </a:rPr>
-              <a:t>?</a:t>
-            </a:r>
-          </a:p>
-          <a:p>
-            <a:pPr lvl="1" fontAlgn="base">
-              <a:spcBef>
-                <a:spcPts val="0"/>
-              </a:spcBef>
-              <a:buFont typeface="+mj-lt"/>
-              <a:buAutoNum type="arabicPeriod"/>
-            </a:pPr>
-            <a:r>
-              <a:rPr lang="en-GB" b="0" i="0" u="none" strike="noStrike" dirty="0">
-                <a:solidFill>
-                  <a:srgbClr val="000000"/>
-                </a:solidFill>
-                <a:effectLst/>
-                <a:latin typeface="Arial" panose="020B0604020202020204" pitchFamily="34" charset="0"/>
-              </a:rPr>
-              <a:t>What is the effect of changing </a:t>
-            </a:r>
-            <a:r>
-              <a:rPr lang="en-GB" b="0" i="0" u="none" strike="noStrike" dirty="0" err="1">
-                <a:solidFill>
-                  <a:srgbClr val="000000"/>
-                </a:solidFill>
-                <a:effectLst/>
-                <a:latin typeface="Arial" panose="020B0604020202020204" pitchFamily="34" charset="0"/>
-              </a:rPr>
-              <a:t>FoV</a:t>
-            </a:r>
-            <a:r>
-              <a:rPr lang="en-GB" b="0" i="0" u="none" strike="noStrike" dirty="0">
-                <a:solidFill>
-                  <a:srgbClr val="000000"/>
-                </a:solidFill>
-                <a:effectLst/>
-                <a:latin typeface="Arial" panose="020B0604020202020204" pitchFamily="34" charset="0"/>
-              </a:rPr>
-              <a:t> on pilot performance?</a:t>
-            </a:r>
-          </a:p>
-          <a:p>
-            <a:pPr lvl="1" fontAlgn="base">
-              <a:spcBef>
-                <a:spcPts val="0"/>
-              </a:spcBef>
-              <a:buFont typeface="+mj-lt"/>
-              <a:buAutoNum type="arabicPeriod"/>
-            </a:pPr>
-            <a:r>
-              <a:rPr lang="en-GB" b="0" i="0" u="none" strike="noStrike" dirty="0">
-                <a:solidFill>
-                  <a:srgbClr val="000000"/>
-                </a:solidFill>
-                <a:effectLst/>
-                <a:latin typeface="Arial" panose="020B0604020202020204" pitchFamily="34" charset="0"/>
-              </a:rPr>
-              <a:t>What strategies do pilots employ to overcome adverse effects of changing </a:t>
-            </a:r>
-            <a:r>
-              <a:rPr lang="en-GB" b="0" i="0" u="none" strike="noStrike" dirty="0" err="1">
-                <a:solidFill>
-                  <a:srgbClr val="000000"/>
-                </a:solidFill>
-                <a:effectLst/>
-                <a:latin typeface="Arial" panose="020B0604020202020204" pitchFamily="34" charset="0"/>
-              </a:rPr>
-              <a:t>FoV</a:t>
-            </a:r>
-            <a:r>
-              <a:rPr lang="en-GB" b="0" i="0" u="none" strike="noStrike" dirty="0">
-                <a:solidFill>
-                  <a:srgbClr val="000000"/>
-                </a:solidFill>
-                <a:effectLst/>
-                <a:latin typeface="Arial" panose="020B0604020202020204" pitchFamily="34" charset="0"/>
-              </a:rPr>
-              <a:t>?</a:t>
-            </a:r>
-          </a:p>
-        </p:txBody>
-      </p:sp>
-    </p:spTree>
-    <p:extLst>
-      <p:ext uri="{BB962C8B-B14F-4D97-AF65-F5344CB8AC3E}">
-        <p14:creationId xmlns:p14="http://schemas.microsoft.com/office/powerpoint/2010/main" val="3732091581"/>
-      </p:ext>
-    </p:extLst>
-  </p:cSld>
-  <p:clrMapOvr>
-    <a:masterClrMapping/>
-  </p:clrMapOvr>
-</p:sld>
-</file>
-
-<file path=ppt/slides/slide30.xml><?xml version="1.0" encoding="utf-8"?>
+<file path=ppt/slides/slide33.xml><?xml version="1.0" encoding="utf-8"?>
 <p:sld xmlns:a="http://schemas.openxmlformats.org/drawingml/2006/main" xmlns:r="http://schemas.openxmlformats.org/officeDocument/2006/relationships" xmlns:p="http://schemas.openxmlformats.org/presentationml/2006/main" show="0">
   <p:cSld>
     <p:spTree>
@@ -11336,7 +11732,7 @@
 </p:sld>
 </file>
 
-<file path=ppt/slides/slide31.xml><?xml version="1.0" encoding="utf-8"?>
+<file path=ppt/slides/slide34.xml><?xml version="1.0" encoding="utf-8"?>
 <p:sld xmlns:a="http://schemas.openxmlformats.org/drawingml/2006/main" xmlns:r="http://schemas.openxmlformats.org/officeDocument/2006/relationships" xmlns:p="http://schemas.openxmlformats.org/presentationml/2006/main" show="0">
   <p:cSld>
     <p:spTree>
@@ -11483,7 +11879,7 @@
 </p:sld>
 </file>
 
-<file path=ppt/slides/slide32.xml><?xml version="1.0" encoding="utf-8"?>
+<file path=ppt/slides/slide35.xml><?xml version="1.0" encoding="utf-8"?>
 <p:sld xmlns:a="http://schemas.openxmlformats.org/drawingml/2006/main" xmlns:r="http://schemas.openxmlformats.org/officeDocument/2006/relationships" xmlns:p="http://schemas.openxmlformats.org/presentationml/2006/main" show="0">
   <p:cSld>
     <p:spTree>
@@ -12108,7 +12504,7 @@
 </p:sld>
 </file>
 
-<file path=ppt/slides/slide33.xml><?xml version="1.0" encoding="utf-8"?>
+<file path=ppt/slides/slide36.xml><?xml version="1.0" encoding="utf-8"?>
 <p:sld xmlns:a="http://schemas.openxmlformats.org/drawingml/2006/main" xmlns:r="http://schemas.openxmlformats.org/officeDocument/2006/relationships" xmlns:p="http://schemas.openxmlformats.org/presentationml/2006/main" show="0">
   <p:cSld>
     <p:spTree>
@@ -12265,7 +12661,7 @@
 </p:sld>
 </file>
 
-<file path=ppt/slides/slide34.xml><?xml version="1.0" encoding="utf-8"?>
+<file path=ppt/slides/slide37.xml><?xml version="1.0" encoding="utf-8"?>
 <p:sld xmlns:a="http://schemas.openxmlformats.org/drawingml/2006/main" xmlns:r="http://schemas.openxmlformats.org/officeDocument/2006/relationships" xmlns:p="http://schemas.openxmlformats.org/presentationml/2006/main" show="0">
   <p:cSld>
     <p:spTree>
@@ -13103,7 +13499,7 @@
 </p:sld>
 </file>
 
-<file path=ppt/slides/slide35.xml><?xml version="1.0" encoding="utf-8"?>
+<file path=ppt/slides/slide38.xml><?xml version="1.0" encoding="utf-8"?>
 <p:sld xmlns:a="http://schemas.openxmlformats.org/drawingml/2006/main" xmlns:r="http://schemas.openxmlformats.org/officeDocument/2006/relationships" xmlns:p="http://schemas.openxmlformats.org/presentationml/2006/main" show="0">
   <p:cSld>
     <p:spTree>
@@ -13569,7 +13965,7 @@
 </p:sld>
 </file>
 
-<file path=ppt/slides/slide36.xml><?xml version="1.0" encoding="utf-8"?>
+<file path=ppt/slides/slide39.xml><?xml version="1.0" encoding="utf-8"?>
 <p:sld xmlns:a="http://schemas.openxmlformats.org/drawingml/2006/main" xmlns:r="http://schemas.openxmlformats.org/officeDocument/2006/relationships" xmlns:p="http://schemas.openxmlformats.org/presentationml/2006/main" show="0">
   <p:cSld>
     <p:spTree>
@@ -13885,422 +14281,6 @@
     <p:extLst>
       <p:ext uri="{BB962C8B-B14F-4D97-AF65-F5344CB8AC3E}">
         <p14:creationId xmlns:p14="http://schemas.microsoft.com/office/powerpoint/2010/main" val="3259562027"/>
-      </p:ext>
-    </p:extLst>
-  </p:cSld>
-  <p:clrMapOvr>
-    <a:masterClrMapping/>
-  </p:clrMapOvr>
-</p:sld>
-</file>
-
-<file path=ppt/slides/slide37.xml><?xml version="1.0" encoding="utf-8"?>
-<p:sld xmlns:a="http://schemas.openxmlformats.org/drawingml/2006/main" xmlns:r="http://schemas.openxmlformats.org/officeDocument/2006/relationships" xmlns:p="http://schemas.openxmlformats.org/presentationml/2006/main" show="0">
-  <p:cSld>
-    <p:spTree>
-      <p:nvGrpSpPr>
-        <p:cNvPr id="1" name=""/>
-        <p:cNvGrpSpPr/>
-        <p:nvPr/>
-      </p:nvGrpSpPr>
-      <p:grpSpPr>
-        <a:xfrm>
-          <a:off x="0" y="0"/>
-          <a:ext cx="0" cy="0"/>
-          <a:chOff x="0" y="0"/>
-          <a:chExt cx="0" cy="0"/>
-        </a:xfrm>
-      </p:grpSpPr>
-      <p:sp>
-        <p:nvSpPr>
-          <p:cNvPr id="2" name="Title 1">
-            <a:extLst>
-              <a:ext uri="{FF2B5EF4-FFF2-40B4-BE49-F238E27FC236}">
-                <a16:creationId xmlns:a16="http://schemas.microsoft.com/office/drawing/2014/main" id="{7F05D986-FF50-C51A-E129-3FC5BD94C81A}"/>
-              </a:ext>
-            </a:extLst>
-          </p:cNvPr>
-          <p:cNvSpPr>
-            <a:spLocks noGrp="1"/>
-          </p:cNvSpPr>
-          <p:nvPr>
-            <p:ph type="title"/>
-          </p:nvPr>
-        </p:nvSpPr>
-        <p:spPr/>
-        <p:txBody>
-          <a:bodyPr/>
-          <a:lstStyle/>
-          <a:p>
-            <a:r>
-              <a:rPr lang="en-US" dirty="0"/>
-              <a:t>Parameter</a:t>
-            </a:r>
-          </a:p>
-        </p:txBody>
-      </p:sp>
-      <p:sp>
-        <p:nvSpPr>
-          <p:cNvPr id="3" name="Content Placeholder 2">
-            <a:extLst>
-              <a:ext uri="{FF2B5EF4-FFF2-40B4-BE49-F238E27FC236}">
-                <a16:creationId xmlns:a16="http://schemas.microsoft.com/office/drawing/2014/main" id="{76DBE841-3B6F-185E-3995-C36ECD23E452}"/>
-              </a:ext>
-            </a:extLst>
-          </p:cNvPr>
-          <p:cNvSpPr>
-            <a:spLocks noGrp="1"/>
-          </p:cNvSpPr>
-          <p:nvPr>
-            <p:ph idx="1"/>
-          </p:nvPr>
-        </p:nvSpPr>
-        <p:spPr/>
-        <p:txBody>
-          <a:bodyPr/>
-          <a:lstStyle/>
-          <a:p>
-            <a:r>
-              <a:rPr lang="en-US" dirty="0"/>
-              <a:t>Find location for maximum screen velocity / actual velocity</a:t>
-            </a:r>
-          </a:p>
-          <a:p>
-            <a:r>
-              <a:rPr lang="en-US" dirty="0"/>
-              <a:t>Ignore projection effects (kappa stays the same)</a:t>
-            </a:r>
-          </a:p>
-          <a:p>
-            <a:r>
-              <a:rPr lang="en-US" dirty="0"/>
-              <a:t>Find value for 1 </a:t>
-            </a:r>
-            <a:r>
-              <a:rPr lang="en-US" dirty="0" err="1"/>
-              <a:t>DoF</a:t>
-            </a:r>
-            <a:r>
-              <a:rPr lang="en-US" dirty="0"/>
-              <a:t> (u)</a:t>
-            </a:r>
-          </a:p>
-          <a:p>
-            <a:r>
-              <a:rPr lang="en-US" dirty="0"/>
-              <a:t>Find value for 2 </a:t>
-            </a:r>
-            <a:r>
-              <a:rPr lang="en-US" dirty="0" err="1"/>
-              <a:t>DoF</a:t>
-            </a:r>
-            <a:r>
-              <a:rPr lang="en-US" dirty="0"/>
-              <a:t> (</a:t>
-            </a:r>
-            <a:r>
-              <a:rPr lang="en-US" dirty="0" err="1"/>
-              <a:t>u,theta</a:t>
-            </a:r>
-            <a:r>
-              <a:rPr lang="en-US" dirty="0"/>
-              <a:t>)</a:t>
-            </a:r>
-          </a:p>
-          <a:p>
-            <a:r>
-              <a:rPr lang="en-US" dirty="0"/>
-              <a:t>Ensure that:</a:t>
-            </a:r>
-          </a:p>
-          <a:p>
-            <a:pPr lvl="1"/>
-            <a:r>
-              <a:rPr lang="en-US" dirty="0"/>
-              <a:t>The projected element is always on screen for 1 </a:t>
-            </a:r>
-            <a:r>
-              <a:rPr lang="en-US" dirty="0" err="1"/>
-              <a:t>Dof</a:t>
-            </a:r>
-            <a:endParaRPr lang="en-US" dirty="0"/>
-          </a:p>
-          <a:p>
-            <a:pPr lvl="1"/>
-            <a:r>
-              <a:rPr lang="en-US" dirty="0"/>
-              <a:t>For 2 </a:t>
-            </a:r>
-            <a:r>
-              <a:rPr lang="en-US" dirty="0" err="1"/>
-              <a:t>dof</a:t>
-            </a:r>
-            <a:r>
-              <a:rPr lang="en-US" dirty="0"/>
-              <a:t>, object is within the view frustum but can be projected off screen</a:t>
-            </a:r>
-          </a:p>
-        </p:txBody>
-      </p:sp>
-    </p:spTree>
-    <p:extLst>
-      <p:ext uri="{BB962C8B-B14F-4D97-AF65-F5344CB8AC3E}">
-        <p14:creationId xmlns:p14="http://schemas.microsoft.com/office/powerpoint/2010/main" val="1805009122"/>
-      </p:ext>
-    </p:extLst>
-  </p:cSld>
-  <p:clrMapOvr>
-    <a:masterClrMapping/>
-  </p:clrMapOvr>
-</p:sld>
-</file>
-
-<file path=ppt/slides/slide38.xml><?xml version="1.0" encoding="utf-8"?>
-<p:sld xmlns:a="http://schemas.openxmlformats.org/drawingml/2006/main" xmlns:r="http://schemas.openxmlformats.org/officeDocument/2006/relationships" xmlns:p="http://schemas.openxmlformats.org/presentationml/2006/main" show="0">
-  <p:cSld>
-    <p:spTree>
-      <p:nvGrpSpPr>
-        <p:cNvPr id="1" name=""/>
-        <p:cNvGrpSpPr/>
-        <p:nvPr/>
-      </p:nvGrpSpPr>
-      <p:grpSpPr>
-        <a:xfrm>
-          <a:off x="0" y="0"/>
-          <a:ext cx="0" cy="0"/>
-          <a:chOff x="0" y="0"/>
-          <a:chExt cx="0" cy="0"/>
-        </a:xfrm>
-      </p:grpSpPr>
-      <p:sp>
-        <p:nvSpPr>
-          <p:cNvPr id="2" name="Title 1">
-            <a:extLst>
-              <a:ext uri="{FF2B5EF4-FFF2-40B4-BE49-F238E27FC236}">
-                <a16:creationId xmlns:a16="http://schemas.microsoft.com/office/drawing/2014/main" id="{92DD19AE-6ADF-4314-DA5A-7CA87F72694A}"/>
-              </a:ext>
-            </a:extLst>
-          </p:cNvPr>
-          <p:cNvSpPr>
-            <a:spLocks noGrp="1"/>
-          </p:cNvSpPr>
-          <p:nvPr>
-            <p:ph type="title"/>
-          </p:nvPr>
-        </p:nvSpPr>
-        <p:spPr/>
-        <p:txBody>
-          <a:bodyPr/>
-          <a:lstStyle/>
-          <a:p>
-            <a:r>
-              <a:rPr lang="en-US" dirty="0"/>
-              <a:t>Potential uses</a:t>
-            </a:r>
-          </a:p>
-        </p:txBody>
-      </p:sp>
-      <p:sp>
-        <p:nvSpPr>
-          <p:cNvPr id="3" name="Content Placeholder 2">
-            <a:extLst>
-              <a:ext uri="{FF2B5EF4-FFF2-40B4-BE49-F238E27FC236}">
-                <a16:creationId xmlns:a16="http://schemas.microsoft.com/office/drawing/2014/main" id="{E3824305-CE10-87F3-A410-94D14EDE5FE7}"/>
-              </a:ext>
-            </a:extLst>
-          </p:cNvPr>
-          <p:cNvSpPr>
-            <a:spLocks noGrp="1"/>
-          </p:cNvSpPr>
-          <p:nvPr>
-            <p:ph idx="1"/>
-          </p:nvPr>
-        </p:nvSpPr>
-        <p:spPr/>
-        <p:txBody>
-          <a:bodyPr/>
-          <a:lstStyle/>
-          <a:p>
-            <a:r>
-              <a:rPr lang="en-US" dirty="0"/>
-              <a:t>Create a list of </a:t>
-            </a:r>
-            <a:r>
-              <a:rPr lang="en-US" dirty="0" err="1"/>
-              <a:t>FoVs</a:t>
-            </a:r>
-            <a:r>
-              <a:rPr lang="en-US" dirty="0"/>
-              <a:t> to test</a:t>
-            </a:r>
-          </a:p>
-          <a:p>
-            <a:r>
-              <a:rPr lang="en-US" dirty="0"/>
-              <a:t>Create list of most prominent objects for these </a:t>
-            </a:r>
-            <a:r>
-              <a:rPr lang="en-US" dirty="0" err="1"/>
-              <a:t>FoVs</a:t>
-            </a:r>
-            <a:endParaRPr lang="en-US" dirty="0"/>
-          </a:p>
-          <a:p>
-            <a:r>
-              <a:rPr lang="en-US" dirty="0"/>
-              <a:t>Link to Control structure?</a:t>
-            </a:r>
-          </a:p>
-        </p:txBody>
-      </p:sp>
-    </p:spTree>
-    <p:extLst>
-      <p:ext uri="{BB962C8B-B14F-4D97-AF65-F5344CB8AC3E}">
-        <p14:creationId xmlns:p14="http://schemas.microsoft.com/office/powerpoint/2010/main" val="2700251108"/>
-      </p:ext>
-    </p:extLst>
-  </p:cSld>
-  <p:clrMapOvr>
-    <a:masterClrMapping/>
-  </p:clrMapOvr>
-</p:sld>
-</file>
-
-<file path=ppt/slides/slide39.xml><?xml version="1.0" encoding="utf-8"?>
-<p:sld xmlns:a="http://schemas.openxmlformats.org/drawingml/2006/main" xmlns:r="http://schemas.openxmlformats.org/officeDocument/2006/relationships" xmlns:p="http://schemas.openxmlformats.org/presentationml/2006/main" show="0">
-  <p:cSld>
-    <p:spTree>
-      <p:nvGrpSpPr>
-        <p:cNvPr id="1" name=""/>
-        <p:cNvGrpSpPr/>
-        <p:nvPr/>
-      </p:nvGrpSpPr>
-      <p:grpSpPr>
-        <a:xfrm>
-          <a:off x="0" y="0"/>
-          <a:ext cx="0" cy="0"/>
-          <a:chOff x="0" y="0"/>
-          <a:chExt cx="0" cy="0"/>
-        </a:xfrm>
-      </p:grpSpPr>
-      <p:sp>
-        <p:nvSpPr>
-          <p:cNvPr id="2" name="Title 1">
-            <a:extLst>
-              <a:ext uri="{FF2B5EF4-FFF2-40B4-BE49-F238E27FC236}">
-                <a16:creationId xmlns:a16="http://schemas.microsoft.com/office/drawing/2014/main" id="{7A29D453-7DE3-5AFC-7519-583BFA64497E}"/>
-              </a:ext>
-            </a:extLst>
-          </p:cNvPr>
-          <p:cNvSpPr>
-            <a:spLocks noGrp="1"/>
-          </p:cNvSpPr>
-          <p:nvPr>
-            <p:ph type="title"/>
-          </p:nvPr>
-        </p:nvSpPr>
-        <p:spPr/>
-        <p:txBody>
-          <a:bodyPr/>
-          <a:lstStyle/>
-          <a:p>
-            <a:r>
-              <a:rPr lang="en-US" dirty="0"/>
-              <a:t>Plan</a:t>
-            </a:r>
-          </a:p>
-        </p:txBody>
-      </p:sp>
-      <p:sp>
-        <p:nvSpPr>
-          <p:cNvPr id="3" name="Content Placeholder 2">
-            <a:extLst>
-              <a:ext uri="{FF2B5EF4-FFF2-40B4-BE49-F238E27FC236}">
-                <a16:creationId xmlns:a16="http://schemas.microsoft.com/office/drawing/2014/main" id="{CF5BAD91-3C87-8853-735C-2106A318558A}"/>
-              </a:ext>
-            </a:extLst>
-          </p:cNvPr>
-          <p:cNvSpPr>
-            <a:spLocks noGrp="1"/>
-          </p:cNvSpPr>
-          <p:nvPr>
-            <p:ph idx="1"/>
-          </p:nvPr>
-        </p:nvSpPr>
-        <p:spPr>
-          <a:xfrm>
-            <a:off x="677334" y="1400568"/>
-            <a:ext cx="7570021" cy="4406466"/>
-          </a:xfrm>
-        </p:spPr>
-        <p:txBody>
-          <a:bodyPr>
-            <a:normAutofit/>
-          </a:bodyPr>
-          <a:lstStyle/>
-          <a:p>
-            <a:r>
-              <a:rPr lang="en-US" dirty="0"/>
-              <a:t>Find a relevant vehicle model</a:t>
-            </a:r>
-          </a:p>
-          <a:p>
-            <a:pPr lvl="1"/>
-            <a:r>
-              <a:rPr lang="en-US" dirty="0"/>
-              <a:t>Consider aspects such as where the disturbance is added (velocity)</a:t>
-            </a:r>
-          </a:p>
-          <a:p>
-            <a:r>
-              <a:rPr lang="en-US" dirty="0"/>
-              <a:t>Design a relevant task</a:t>
-            </a:r>
-          </a:p>
-          <a:p>
-            <a:pPr lvl="1"/>
-            <a:r>
-              <a:rPr lang="en-US" dirty="0"/>
-              <a:t>Relevant forcing function</a:t>
-            </a:r>
-          </a:p>
-          <a:p>
-            <a:pPr lvl="1"/>
-            <a:r>
-              <a:rPr lang="en-US" dirty="0"/>
-              <a:t>Visuals</a:t>
-            </a:r>
-          </a:p>
-          <a:p>
-            <a:r>
-              <a:rPr lang="en-US" dirty="0"/>
-              <a:t>Predict what the Cybernetic model will look like for this task</a:t>
-            </a:r>
-          </a:p>
-          <a:p>
-            <a:r>
-              <a:rPr lang="en-US" dirty="0"/>
-              <a:t>Predict what the model will look like as velocity perception goes to 0 with lower </a:t>
-            </a:r>
-            <a:r>
-              <a:rPr lang="en-US" dirty="0" err="1"/>
-              <a:t>FoV</a:t>
-            </a:r>
-            <a:endParaRPr lang="en-US" dirty="0"/>
-          </a:p>
-          <a:p>
-            <a:pPr lvl="1"/>
-            <a:r>
-              <a:rPr lang="en-US" dirty="0"/>
-              <a:t>See if control loop is sensitive to velocity perception</a:t>
-            </a:r>
-          </a:p>
-        </p:txBody>
-      </p:sp>
-    </p:spTree>
-    <p:extLst>
-      <p:ext uri="{BB962C8B-B14F-4D97-AF65-F5344CB8AC3E}">
-        <p14:creationId xmlns:p14="http://schemas.microsoft.com/office/powerpoint/2010/main" val="2479029850"/>
       </p:ext>
     </p:extLst>
   </p:cSld>
@@ -14375,7 +14355,7 @@
         </p:nvSpPr>
         <p:spPr>
           <a:xfrm>
-            <a:off x="5988613" y="5237820"/>
+            <a:off x="6005391" y="5430767"/>
             <a:ext cx="343948" cy="176169"/>
           </a:xfrm>
           <a:prstGeom prst="ellipse">
@@ -14448,6 +14428,422 @@
           <p:cNvPr id="2" name="Title 1">
             <a:extLst>
               <a:ext uri="{FF2B5EF4-FFF2-40B4-BE49-F238E27FC236}">
+                <a16:creationId xmlns:a16="http://schemas.microsoft.com/office/drawing/2014/main" id="{7F05D986-FF50-C51A-E129-3FC5BD94C81A}"/>
+              </a:ext>
+            </a:extLst>
+          </p:cNvPr>
+          <p:cNvSpPr>
+            <a:spLocks noGrp="1"/>
+          </p:cNvSpPr>
+          <p:nvPr>
+            <p:ph type="title"/>
+          </p:nvPr>
+        </p:nvSpPr>
+        <p:spPr/>
+        <p:txBody>
+          <a:bodyPr/>
+          <a:lstStyle/>
+          <a:p>
+            <a:r>
+              <a:rPr lang="en-US" dirty="0"/>
+              <a:t>Parameter</a:t>
+            </a:r>
+          </a:p>
+        </p:txBody>
+      </p:sp>
+      <p:sp>
+        <p:nvSpPr>
+          <p:cNvPr id="3" name="Content Placeholder 2">
+            <a:extLst>
+              <a:ext uri="{FF2B5EF4-FFF2-40B4-BE49-F238E27FC236}">
+                <a16:creationId xmlns:a16="http://schemas.microsoft.com/office/drawing/2014/main" id="{76DBE841-3B6F-185E-3995-C36ECD23E452}"/>
+              </a:ext>
+            </a:extLst>
+          </p:cNvPr>
+          <p:cNvSpPr>
+            <a:spLocks noGrp="1"/>
+          </p:cNvSpPr>
+          <p:nvPr>
+            <p:ph idx="1"/>
+          </p:nvPr>
+        </p:nvSpPr>
+        <p:spPr/>
+        <p:txBody>
+          <a:bodyPr/>
+          <a:lstStyle/>
+          <a:p>
+            <a:r>
+              <a:rPr lang="en-US" dirty="0"/>
+              <a:t>Find location for maximum screen velocity / actual velocity</a:t>
+            </a:r>
+          </a:p>
+          <a:p>
+            <a:r>
+              <a:rPr lang="en-US" dirty="0"/>
+              <a:t>Ignore projection effects (kappa stays the same)</a:t>
+            </a:r>
+          </a:p>
+          <a:p>
+            <a:r>
+              <a:rPr lang="en-US" dirty="0"/>
+              <a:t>Find value for 1 </a:t>
+            </a:r>
+            <a:r>
+              <a:rPr lang="en-US" dirty="0" err="1"/>
+              <a:t>DoF</a:t>
+            </a:r>
+            <a:r>
+              <a:rPr lang="en-US" dirty="0"/>
+              <a:t> (u)</a:t>
+            </a:r>
+          </a:p>
+          <a:p>
+            <a:r>
+              <a:rPr lang="en-US" dirty="0"/>
+              <a:t>Find value for 2 </a:t>
+            </a:r>
+            <a:r>
+              <a:rPr lang="en-US" dirty="0" err="1"/>
+              <a:t>DoF</a:t>
+            </a:r>
+            <a:r>
+              <a:rPr lang="en-US" dirty="0"/>
+              <a:t> (</a:t>
+            </a:r>
+            <a:r>
+              <a:rPr lang="en-US" dirty="0" err="1"/>
+              <a:t>u,theta</a:t>
+            </a:r>
+            <a:r>
+              <a:rPr lang="en-US" dirty="0"/>
+              <a:t>)</a:t>
+            </a:r>
+          </a:p>
+          <a:p>
+            <a:r>
+              <a:rPr lang="en-US" dirty="0"/>
+              <a:t>Ensure that:</a:t>
+            </a:r>
+          </a:p>
+          <a:p>
+            <a:pPr lvl="1"/>
+            <a:r>
+              <a:rPr lang="en-US" dirty="0"/>
+              <a:t>The projected element is always on screen for 1 </a:t>
+            </a:r>
+            <a:r>
+              <a:rPr lang="en-US" dirty="0" err="1"/>
+              <a:t>Dof</a:t>
+            </a:r>
+            <a:endParaRPr lang="en-US" dirty="0"/>
+          </a:p>
+          <a:p>
+            <a:pPr lvl="1"/>
+            <a:r>
+              <a:rPr lang="en-US" dirty="0"/>
+              <a:t>For 2 </a:t>
+            </a:r>
+            <a:r>
+              <a:rPr lang="en-US" dirty="0" err="1"/>
+              <a:t>dof</a:t>
+            </a:r>
+            <a:r>
+              <a:rPr lang="en-US" dirty="0"/>
+              <a:t>, object is within the view frustum but can be projected off screen</a:t>
+            </a:r>
+          </a:p>
+        </p:txBody>
+      </p:sp>
+    </p:spTree>
+    <p:extLst>
+      <p:ext uri="{BB962C8B-B14F-4D97-AF65-F5344CB8AC3E}">
+        <p14:creationId xmlns:p14="http://schemas.microsoft.com/office/powerpoint/2010/main" val="1805009122"/>
+      </p:ext>
+    </p:extLst>
+  </p:cSld>
+  <p:clrMapOvr>
+    <a:masterClrMapping/>
+  </p:clrMapOvr>
+</p:sld>
+</file>
+
+<file path=ppt/slides/slide41.xml><?xml version="1.0" encoding="utf-8"?>
+<p:sld xmlns:a="http://schemas.openxmlformats.org/drawingml/2006/main" xmlns:r="http://schemas.openxmlformats.org/officeDocument/2006/relationships" xmlns:p="http://schemas.openxmlformats.org/presentationml/2006/main" show="0">
+  <p:cSld>
+    <p:spTree>
+      <p:nvGrpSpPr>
+        <p:cNvPr id="1" name=""/>
+        <p:cNvGrpSpPr/>
+        <p:nvPr/>
+      </p:nvGrpSpPr>
+      <p:grpSpPr>
+        <a:xfrm>
+          <a:off x="0" y="0"/>
+          <a:ext cx="0" cy="0"/>
+          <a:chOff x="0" y="0"/>
+          <a:chExt cx="0" cy="0"/>
+        </a:xfrm>
+      </p:grpSpPr>
+      <p:sp>
+        <p:nvSpPr>
+          <p:cNvPr id="2" name="Title 1">
+            <a:extLst>
+              <a:ext uri="{FF2B5EF4-FFF2-40B4-BE49-F238E27FC236}">
+                <a16:creationId xmlns:a16="http://schemas.microsoft.com/office/drawing/2014/main" id="{92DD19AE-6ADF-4314-DA5A-7CA87F72694A}"/>
+              </a:ext>
+            </a:extLst>
+          </p:cNvPr>
+          <p:cNvSpPr>
+            <a:spLocks noGrp="1"/>
+          </p:cNvSpPr>
+          <p:nvPr>
+            <p:ph type="title"/>
+          </p:nvPr>
+        </p:nvSpPr>
+        <p:spPr/>
+        <p:txBody>
+          <a:bodyPr/>
+          <a:lstStyle/>
+          <a:p>
+            <a:r>
+              <a:rPr lang="en-US" dirty="0"/>
+              <a:t>Potential uses</a:t>
+            </a:r>
+          </a:p>
+        </p:txBody>
+      </p:sp>
+      <p:sp>
+        <p:nvSpPr>
+          <p:cNvPr id="3" name="Content Placeholder 2">
+            <a:extLst>
+              <a:ext uri="{FF2B5EF4-FFF2-40B4-BE49-F238E27FC236}">
+                <a16:creationId xmlns:a16="http://schemas.microsoft.com/office/drawing/2014/main" id="{E3824305-CE10-87F3-A410-94D14EDE5FE7}"/>
+              </a:ext>
+            </a:extLst>
+          </p:cNvPr>
+          <p:cNvSpPr>
+            <a:spLocks noGrp="1"/>
+          </p:cNvSpPr>
+          <p:nvPr>
+            <p:ph idx="1"/>
+          </p:nvPr>
+        </p:nvSpPr>
+        <p:spPr/>
+        <p:txBody>
+          <a:bodyPr/>
+          <a:lstStyle/>
+          <a:p>
+            <a:r>
+              <a:rPr lang="en-US" dirty="0"/>
+              <a:t>Create a list of </a:t>
+            </a:r>
+            <a:r>
+              <a:rPr lang="en-US" dirty="0" err="1"/>
+              <a:t>FoVs</a:t>
+            </a:r>
+            <a:r>
+              <a:rPr lang="en-US" dirty="0"/>
+              <a:t> to test</a:t>
+            </a:r>
+          </a:p>
+          <a:p>
+            <a:r>
+              <a:rPr lang="en-US" dirty="0"/>
+              <a:t>Create list of most prominent objects for these </a:t>
+            </a:r>
+            <a:r>
+              <a:rPr lang="en-US" dirty="0" err="1"/>
+              <a:t>FoVs</a:t>
+            </a:r>
+            <a:endParaRPr lang="en-US" dirty="0"/>
+          </a:p>
+          <a:p>
+            <a:r>
+              <a:rPr lang="en-US" dirty="0"/>
+              <a:t>Link to Control structure?</a:t>
+            </a:r>
+          </a:p>
+        </p:txBody>
+      </p:sp>
+    </p:spTree>
+    <p:extLst>
+      <p:ext uri="{BB962C8B-B14F-4D97-AF65-F5344CB8AC3E}">
+        <p14:creationId xmlns:p14="http://schemas.microsoft.com/office/powerpoint/2010/main" val="2700251108"/>
+      </p:ext>
+    </p:extLst>
+  </p:cSld>
+  <p:clrMapOvr>
+    <a:masterClrMapping/>
+  </p:clrMapOvr>
+</p:sld>
+</file>
+
+<file path=ppt/slides/slide42.xml><?xml version="1.0" encoding="utf-8"?>
+<p:sld xmlns:a="http://schemas.openxmlformats.org/drawingml/2006/main" xmlns:r="http://schemas.openxmlformats.org/officeDocument/2006/relationships" xmlns:p="http://schemas.openxmlformats.org/presentationml/2006/main" show="0">
+  <p:cSld>
+    <p:spTree>
+      <p:nvGrpSpPr>
+        <p:cNvPr id="1" name=""/>
+        <p:cNvGrpSpPr/>
+        <p:nvPr/>
+      </p:nvGrpSpPr>
+      <p:grpSpPr>
+        <a:xfrm>
+          <a:off x="0" y="0"/>
+          <a:ext cx="0" cy="0"/>
+          <a:chOff x="0" y="0"/>
+          <a:chExt cx="0" cy="0"/>
+        </a:xfrm>
+      </p:grpSpPr>
+      <p:sp>
+        <p:nvSpPr>
+          <p:cNvPr id="2" name="Title 1">
+            <a:extLst>
+              <a:ext uri="{FF2B5EF4-FFF2-40B4-BE49-F238E27FC236}">
+                <a16:creationId xmlns:a16="http://schemas.microsoft.com/office/drawing/2014/main" id="{7A29D453-7DE3-5AFC-7519-583BFA64497E}"/>
+              </a:ext>
+            </a:extLst>
+          </p:cNvPr>
+          <p:cNvSpPr>
+            <a:spLocks noGrp="1"/>
+          </p:cNvSpPr>
+          <p:nvPr>
+            <p:ph type="title"/>
+          </p:nvPr>
+        </p:nvSpPr>
+        <p:spPr/>
+        <p:txBody>
+          <a:bodyPr/>
+          <a:lstStyle/>
+          <a:p>
+            <a:r>
+              <a:rPr lang="en-US" dirty="0"/>
+              <a:t>Plan</a:t>
+            </a:r>
+          </a:p>
+        </p:txBody>
+      </p:sp>
+      <p:sp>
+        <p:nvSpPr>
+          <p:cNvPr id="3" name="Content Placeholder 2">
+            <a:extLst>
+              <a:ext uri="{FF2B5EF4-FFF2-40B4-BE49-F238E27FC236}">
+                <a16:creationId xmlns:a16="http://schemas.microsoft.com/office/drawing/2014/main" id="{CF5BAD91-3C87-8853-735C-2106A318558A}"/>
+              </a:ext>
+            </a:extLst>
+          </p:cNvPr>
+          <p:cNvSpPr>
+            <a:spLocks noGrp="1"/>
+          </p:cNvSpPr>
+          <p:nvPr>
+            <p:ph idx="1"/>
+          </p:nvPr>
+        </p:nvSpPr>
+        <p:spPr>
+          <a:xfrm>
+            <a:off x="677334" y="1400568"/>
+            <a:ext cx="7570021" cy="4406466"/>
+          </a:xfrm>
+        </p:spPr>
+        <p:txBody>
+          <a:bodyPr>
+            <a:normAutofit/>
+          </a:bodyPr>
+          <a:lstStyle/>
+          <a:p>
+            <a:r>
+              <a:rPr lang="en-US" dirty="0"/>
+              <a:t>Find a relevant vehicle model</a:t>
+            </a:r>
+          </a:p>
+          <a:p>
+            <a:pPr lvl="1"/>
+            <a:r>
+              <a:rPr lang="en-US" dirty="0"/>
+              <a:t>Consider aspects such as where the disturbance is added (velocity)</a:t>
+            </a:r>
+          </a:p>
+          <a:p>
+            <a:r>
+              <a:rPr lang="en-US" dirty="0"/>
+              <a:t>Design a relevant task</a:t>
+            </a:r>
+          </a:p>
+          <a:p>
+            <a:pPr lvl="1"/>
+            <a:r>
+              <a:rPr lang="en-US" dirty="0"/>
+              <a:t>Relevant forcing function</a:t>
+            </a:r>
+          </a:p>
+          <a:p>
+            <a:pPr lvl="1"/>
+            <a:r>
+              <a:rPr lang="en-US" dirty="0"/>
+              <a:t>Visuals</a:t>
+            </a:r>
+          </a:p>
+          <a:p>
+            <a:r>
+              <a:rPr lang="en-US" dirty="0"/>
+              <a:t>Predict what the Cybernetic model will look like for this task</a:t>
+            </a:r>
+          </a:p>
+          <a:p>
+            <a:r>
+              <a:rPr lang="en-US" dirty="0"/>
+              <a:t>Predict what the model will look like as velocity perception goes to 0 with lower </a:t>
+            </a:r>
+            <a:r>
+              <a:rPr lang="en-US" dirty="0" err="1"/>
+              <a:t>FoV</a:t>
+            </a:r>
+            <a:endParaRPr lang="en-US" dirty="0"/>
+          </a:p>
+          <a:p>
+            <a:pPr lvl="1"/>
+            <a:r>
+              <a:rPr lang="en-US" dirty="0"/>
+              <a:t>See if control loop is sensitive to velocity perception</a:t>
+            </a:r>
+          </a:p>
+        </p:txBody>
+      </p:sp>
+    </p:spTree>
+    <p:extLst>
+      <p:ext uri="{BB962C8B-B14F-4D97-AF65-F5344CB8AC3E}">
+        <p14:creationId xmlns:p14="http://schemas.microsoft.com/office/powerpoint/2010/main" val="2479029850"/>
+      </p:ext>
+    </p:extLst>
+  </p:cSld>
+  <p:clrMapOvr>
+    <a:masterClrMapping/>
+  </p:clrMapOvr>
+</p:sld>
+</file>
+
+<file path=ppt/slides/slide43.xml><?xml version="1.0" encoding="utf-8"?>
+<p:sld xmlns:a="http://schemas.openxmlformats.org/drawingml/2006/main" xmlns:r="http://schemas.openxmlformats.org/officeDocument/2006/relationships" xmlns:p="http://schemas.openxmlformats.org/presentationml/2006/main" show="0">
+  <p:cSld>
+    <p:spTree>
+      <p:nvGrpSpPr>
+        <p:cNvPr id="1" name=""/>
+        <p:cNvGrpSpPr/>
+        <p:nvPr/>
+      </p:nvGrpSpPr>
+      <p:grpSpPr>
+        <a:xfrm>
+          <a:off x="0" y="0"/>
+          <a:ext cx="0" cy="0"/>
+          <a:chOff x="0" y="0"/>
+          <a:chExt cx="0" cy="0"/>
+        </a:xfrm>
+      </p:grpSpPr>
+      <p:sp>
+        <p:nvSpPr>
+          <p:cNvPr id="2" name="Title 1">
+            <a:extLst>
+              <a:ext uri="{FF2B5EF4-FFF2-40B4-BE49-F238E27FC236}">
                 <a16:creationId xmlns:a16="http://schemas.microsoft.com/office/drawing/2014/main" id="{AD625028-0FF7-13D1-47C4-E5EAF575F86C}"/>
               </a:ext>
             </a:extLst>
@@ -14715,7 +15111,7 @@
 </p:sld>
 </file>
 
-<file path=ppt/slides/slide41.xml><?xml version="1.0" encoding="utf-8"?>
+<file path=ppt/slides/slide44.xml><?xml version="1.0" encoding="utf-8"?>
 <p:sld xmlns:a="http://schemas.openxmlformats.org/drawingml/2006/main" xmlns:r="http://schemas.openxmlformats.org/officeDocument/2006/relationships" xmlns:p="http://schemas.openxmlformats.org/presentationml/2006/main" show="0">
   <p:cSld>
     <p:spTree>
@@ -14832,7 +15228,7 @@
 </p:sld>
 </file>
 
-<file path=ppt/slides/slide42.xml><?xml version="1.0" encoding="utf-8"?>
+<file path=ppt/slides/slide45.xml><?xml version="1.0" encoding="utf-8"?>
 <p:sld xmlns:a="http://schemas.openxmlformats.org/drawingml/2006/main" xmlns:r="http://schemas.openxmlformats.org/officeDocument/2006/relationships" xmlns:p="http://schemas.openxmlformats.org/presentationml/2006/main" show="0">
   <p:cSld>
     <p:spTree>
@@ -14990,7 +15386,7 @@
 </p:sld>
 </file>
 
-<file path=ppt/slides/slide43.xml><?xml version="1.0" encoding="utf-8"?>
+<file path=ppt/slides/slide46.xml><?xml version="1.0" encoding="utf-8"?>
 <p:sld xmlns:a="http://schemas.openxmlformats.org/drawingml/2006/main" xmlns:r="http://schemas.openxmlformats.org/officeDocument/2006/relationships" xmlns:p="http://schemas.openxmlformats.org/presentationml/2006/main" show="0">
   <p:cSld>
     <p:spTree>
@@ -15188,7 +15584,7 @@
 </p:sld>
 </file>
 
-<file path=ppt/slides/slide44.xml><?xml version="1.0" encoding="utf-8"?>
+<file path=ppt/slides/slide47.xml><?xml version="1.0" encoding="utf-8"?>
 <p:sld xmlns:a="http://schemas.openxmlformats.org/drawingml/2006/main" xmlns:r="http://schemas.openxmlformats.org/officeDocument/2006/relationships" xmlns:p="http://schemas.openxmlformats.org/presentationml/2006/main" show="0">
   <p:cSld>
     <p:spTree>
@@ -15311,7 +15707,7 @@
           <a:p>
             <a:r>
               <a:rPr lang="en-GB" dirty="0"/>
-              <a:t>Changes</a:t>
+              <a:t>Analysis</a:t>
             </a:r>
           </a:p>
         </p:txBody>
@@ -15339,29 +15735,13 @@
           <a:p>
             <a:r>
               <a:rPr lang="en-GB" dirty="0"/>
-              <a:t>Analyse delta Azimuth and elevation </a:t>
-            </a:r>
-            <a:r>
-              <a:rPr lang="en-GB" dirty="0" err="1"/>
-              <a:t>wrt</a:t>
-            </a:r>
+              <a:t>Analyse flow on the retina of the pilot</a:t>
+            </a:r>
+          </a:p>
+          <a:p>
             <a:r>
               <a:rPr lang="en-GB" dirty="0"/>
-              <a:t> distance instead of speed</a:t>
-            </a:r>
-          </a:p>
-          <a:p>
-            <a:r>
-              <a:rPr lang="en-GB" dirty="0"/>
-              <a:t>Find out at which </a:t>
-            </a:r>
-            <a:r>
-              <a:rPr lang="en-GB" dirty="0" err="1"/>
-              <a:t>FoV</a:t>
-            </a:r>
-            <a:r>
-              <a:rPr lang="en-GB" dirty="0"/>
-              <a:t> the differential is highest</a:t>
+              <a:t>Analyse changes in azimuth and elevation angles</a:t>
             </a:r>
           </a:p>
         </p:txBody>
@@ -15380,7 +15760,7 @@
 </file>
 
 <file path=ppt/slides/slide6.xml><?xml version="1.0" encoding="utf-8"?>
-<p:sld xmlns:a="http://schemas.openxmlformats.org/drawingml/2006/main" xmlns:r="http://schemas.openxmlformats.org/officeDocument/2006/relationships" xmlns:p="http://schemas.openxmlformats.org/presentationml/2006/main" show="0">
+<p:sld xmlns:a="http://schemas.openxmlformats.org/drawingml/2006/main" xmlns:r="http://schemas.openxmlformats.org/officeDocument/2006/relationships" xmlns:p="http://schemas.openxmlformats.org/presentationml/2006/main">
   <p:cSld>
     <p:spTree>
       <p:nvGrpSpPr>
@@ -15401,7 +15781,7 @@
           <p:cNvPr id="2" name="Title 1">
             <a:extLst>
               <a:ext uri="{FF2B5EF4-FFF2-40B4-BE49-F238E27FC236}">
-                <a16:creationId xmlns:a16="http://schemas.microsoft.com/office/drawing/2014/main" id="{87DDA15E-8EDF-F048-4393-F170395C7488}"/>
+                <a16:creationId xmlns:a16="http://schemas.microsoft.com/office/drawing/2014/main" id="{EC877538-81D2-4027-51F6-5C1D01D71AC7}"/>
               </a:ext>
             </a:extLst>
           </p:cNvPr>
@@ -15419,94 +15799,122 @@
           <a:p>
             <a:r>
               <a:rPr lang="en-GB" dirty="0"/>
-              <a:t>Method</a:t>
-            </a:r>
-          </a:p>
-        </p:txBody>
-      </p:sp>
-      <p:sp>
-        <p:nvSpPr>
-          <p:cNvPr id="3" name="Content Placeholder 2">
+              <a:t>Motion</a:t>
+            </a:r>
+          </a:p>
+        </p:txBody>
+      </p:sp>
+      <p:pic>
+        <p:nvPicPr>
+          <p:cNvPr id="5" name="Content Placeholder 4" descr="A graph of a function&#10;&#10;Description automatically generated">
             <a:extLst>
               <a:ext uri="{FF2B5EF4-FFF2-40B4-BE49-F238E27FC236}">
-                <a16:creationId xmlns:a16="http://schemas.microsoft.com/office/drawing/2014/main" id="{A5367758-8372-E52E-14D0-31E78C61FEC7}"/>
+                <a16:creationId xmlns:a16="http://schemas.microsoft.com/office/drawing/2014/main" id="{41C0BE8C-F2DE-10F9-545F-85D6C5FBC813}"/>
               </a:ext>
             </a:extLst>
           </p:cNvPr>
-          <p:cNvSpPr>
-            <a:spLocks noGrp="1"/>
-          </p:cNvSpPr>
+          <p:cNvPicPr>
+            <a:picLocks noGrp="1" noChangeAspect="1"/>
+          </p:cNvPicPr>
           <p:nvPr>
             <p:ph idx="1"/>
           </p:nvPr>
-        </p:nvSpPr>
-        <p:spPr/>
-        <p:txBody>
-          <a:bodyPr/>
-          <a:lstStyle/>
-          <a:p>
-            <a:r>
-              <a:rPr lang="en-GB" dirty="0"/>
-              <a:t>Use the input to generate the speed and pitching angles</a:t>
-            </a:r>
-          </a:p>
-          <a:p>
-            <a:r>
-              <a:rPr lang="en-GB" dirty="0"/>
-              <a:t>Fix z to -5 metres (on the ground)</a:t>
-            </a:r>
-          </a:p>
-          <a:p>
-            <a:r>
-              <a:rPr lang="en-GB" dirty="0"/>
-              <a:t>Still need to fix x and y</a:t>
-            </a:r>
-          </a:p>
-          <a:p>
-            <a:pPr lvl="1"/>
-            <a:r>
-              <a:rPr lang="en-GB" dirty="0"/>
-              <a:t>Fix them based on </a:t>
-            </a:r>
-            <a:r>
-              <a:rPr lang="en-GB" dirty="0" err="1"/>
-              <a:t>FoV</a:t>
-            </a:r>
-            <a:endParaRPr lang="en-GB" dirty="0"/>
-          </a:p>
-          <a:p>
-            <a:pPr lvl="1"/>
-            <a:r>
-              <a:rPr lang="en-GB" dirty="0"/>
-              <a:t>For a particular </a:t>
-            </a:r>
-            <a:r>
-              <a:rPr lang="en-GB" dirty="0" err="1"/>
-              <a:t>FoV</a:t>
-            </a:r>
-            <a:r>
-              <a:rPr lang="en-GB" dirty="0"/>
-              <a:t>, find the behaviour for different x and y values</a:t>
-            </a:r>
-          </a:p>
-          <a:p>
-            <a:pPr lvl="1"/>
-            <a:r>
-              <a:rPr lang="en-GB" dirty="0"/>
-              <a:t>Average this behaviour to find the behaviour for this </a:t>
-            </a:r>
-            <a:r>
-              <a:rPr lang="en-GB" dirty="0" err="1"/>
-              <a:t>FoV</a:t>
-            </a:r>
-            <a:endParaRPr lang="en-GB" dirty="0"/>
-          </a:p>
-        </p:txBody>
-      </p:sp>
+        </p:nvPicPr>
+        <p:blipFill>
+          <a:blip r:embed="rId2">
+            <a:extLst>
+              <a:ext uri="{28A0092B-C50C-407E-A947-70E740481C1C}">
+                <a14:useLocalDpi xmlns:a14="http://schemas.microsoft.com/office/drawing/2010/main" val="0"/>
+              </a:ext>
+            </a:extLst>
+          </a:blip>
+          <a:stretch>
+            <a:fillRect/>
+          </a:stretch>
+        </p:blipFill>
+        <p:spPr>
+          <a:xfrm>
+            <a:off x="4238906" y="1334754"/>
+            <a:ext cx="3714188" cy="2785641"/>
+          </a:xfrm>
+        </p:spPr>
+      </p:pic>
+      <p:pic>
+        <p:nvPicPr>
+          <p:cNvPr id="7" name="Picture 6" descr="A graph with a line&#10;&#10;Description automatically generated">
+            <a:extLst>
+              <a:ext uri="{FF2B5EF4-FFF2-40B4-BE49-F238E27FC236}">
+                <a16:creationId xmlns:a16="http://schemas.microsoft.com/office/drawing/2014/main" id="{79A8DA42-86EE-64B5-6A5B-22211E5D5CE3}"/>
+              </a:ext>
+            </a:extLst>
+          </p:cNvPr>
+          <p:cNvPicPr>
+            <a:picLocks noChangeAspect="1"/>
+          </p:cNvPicPr>
+          <p:nvPr/>
+        </p:nvPicPr>
+        <p:blipFill>
+          <a:blip r:embed="rId3">
+            <a:extLst>
+              <a:ext uri="{28A0092B-C50C-407E-A947-70E740481C1C}">
+                <a14:useLocalDpi xmlns:a14="http://schemas.microsoft.com/office/drawing/2010/main" val="0"/>
+              </a:ext>
+            </a:extLst>
+          </a:blip>
+          <a:stretch>
+            <a:fillRect/>
+          </a:stretch>
+        </p:blipFill>
+        <p:spPr>
+          <a:xfrm>
+            <a:off x="7684002" y="1137872"/>
+            <a:ext cx="4239208" cy="3179406"/>
+          </a:xfrm>
+          <a:prstGeom prst="rect">
+            <a:avLst/>
+          </a:prstGeom>
+        </p:spPr>
+      </p:pic>
+      <p:pic>
+        <p:nvPicPr>
+          <p:cNvPr id="9" name="Picture 8" descr="A graph with blue lines&#10;&#10;Description automatically generated">
+            <a:extLst>
+              <a:ext uri="{FF2B5EF4-FFF2-40B4-BE49-F238E27FC236}">
+                <a16:creationId xmlns:a16="http://schemas.microsoft.com/office/drawing/2014/main" id="{C7113D4D-C93A-841F-806C-D6B149A97622}"/>
+              </a:ext>
+            </a:extLst>
+          </p:cNvPr>
+          <p:cNvPicPr>
+            <a:picLocks noChangeAspect="1"/>
+          </p:cNvPicPr>
+          <p:nvPr/>
+        </p:nvPicPr>
+        <p:blipFill>
+          <a:blip r:embed="rId4">
+            <a:extLst>
+              <a:ext uri="{28A0092B-C50C-407E-A947-70E740481C1C}">
+                <a14:useLocalDpi xmlns:a14="http://schemas.microsoft.com/office/drawing/2010/main" val="0"/>
+              </a:ext>
+            </a:extLst>
+          </a:blip>
+          <a:stretch>
+            <a:fillRect/>
+          </a:stretch>
+        </p:blipFill>
+        <p:spPr>
+          <a:xfrm>
+            <a:off x="268790" y="1137872"/>
+            <a:ext cx="4239208" cy="3179406"/>
+          </a:xfrm>
+          <a:prstGeom prst="rect">
+            <a:avLst/>
+          </a:prstGeom>
+        </p:spPr>
+      </p:pic>
     </p:spTree>
     <p:extLst>
       <p:ext uri="{BB962C8B-B14F-4D97-AF65-F5344CB8AC3E}">
-        <p14:creationId xmlns:p14="http://schemas.microsoft.com/office/powerpoint/2010/main" val="1470631209"/>
+        <p14:creationId xmlns:p14="http://schemas.microsoft.com/office/powerpoint/2010/main" val="1656226588"/>
       </p:ext>
     </p:extLst>
   </p:cSld>
@@ -15517,7 +15925,330 @@
 </file>
 
 <file path=ppt/slides/slide7.xml><?xml version="1.0" encoding="utf-8"?>
-<p:sld xmlns:a="http://schemas.openxmlformats.org/drawingml/2006/main" xmlns:r="http://schemas.openxmlformats.org/officeDocument/2006/relationships" xmlns:p="http://schemas.openxmlformats.org/presentationml/2006/main" show="0">
+<p:sld xmlns:a="http://schemas.openxmlformats.org/drawingml/2006/main" xmlns:r="http://schemas.openxmlformats.org/officeDocument/2006/relationships" xmlns:p="http://schemas.openxmlformats.org/presentationml/2006/main">
+  <p:cSld>
+    <p:spTree>
+      <p:nvGrpSpPr>
+        <p:cNvPr id="1" name=""/>
+        <p:cNvGrpSpPr/>
+        <p:nvPr/>
+      </p:nvGrpSpPr>
+      <p:grpSpPr>
+        <a:xfrm>
+          <a:off x="0" y="0"/>
+          <a:ext cx="0" cy="0"/>
+          <a:chOff x="0" y="0"/>
+          <a:chExt cx="0" cy="0"/>
+        </a:xfrm>
+      </p:grpSpPr>
+      <p:sp>
+        <p:nvSpPr>
+          <p:cNvPr id="2" name="Title 1">
+            <a:extLst>
+              <a:ext uri="{FF2B5EF4-FFF2-40B4-BE49-F238E27FC236}">
+                <a16:creationId xmlns:a16="http://schemas.microsoft.com/office/drawing/2014/main" id="{26184F71-FAA9-A75E-25D4-DE43FCDB7F84}"/>
+              </a:ext>
+            </a:extLst>
+          </p:cNvPr>
+          <p:cNvSpPr>
+            <a:spLocks noGrp="1"/>
+          </p:cNvSpPr>
+          <p:nvPr>
+            <p:ph type="title"/>
+          </p:nvPr>
+        </p:nvSpPr>
+        <p:spPr/>
+        <p:txBody>
+          <a:bodyPr/>
+          <a:lstStyle/>
+          <a:p>
+            <a:endParaRPr lang="en-GB" dirty="0"/>
+          </a:p>
+        </p:txBody>
+      </p:sp>
+      <p:sp>
+        <p:nvSpPr>
+          <p:cNvPr id="3" name="Content Placeholder 2">
+            <a:extLst>
+              <a:ext uri="{FF2B5EF4-FFF2-40B4-BE49-F238E27FC236}">
+                <a16:creationId xmlns:a16="http://schemas.microsoft.com/office/drawing/2014/main" id="{47DDB59A-DE3B-C17A-74C5-7A9E444F8757}"/>
+              </a:ext>
+            </a:extLst>
+          </p:cNvPr>
+          <p:cNvSpPr>
+            <a:spLocks noGrp="1"/>
+          </p:cNvSpPr>
+          <p:nvPr>
+            <p:ph idx="1"/>
+          </p:nvPr>
+        </p:nvSpPr>
+        <p:spPr/>
+        <p:txBody>
+          <a:bodyPr/>
+          <a:lstStyle/>
+          <a:p>
+            <a:endParaRPr lang="en-GB"/>
+          </a:p>
+        </p:txBody>
+      </p:sp>
+      <p:pic>
+        <p:nvPicPr>
+          <p:cNvPr id="5" name="Picture 4">
+            <a:extLst>
+              <a:ext uri="{FF2B5EF4-FFF2-40B4-BE49-F238E27FC236}">
+                <a16:creationId xmlns:a16="http://schemas.microsoft.com/office/drawing/2014/main" id="{2702BA07-E790-7E20-5017-A501A76210E6}"/>
+              </a:ext>
+            </a:extLst>
+          </p:cNvPr>
+          <p:cNvPicPr>
+            <a:picLocks noChangeAspect="1"/>
+          </p:cNvPicPr>
+          <p:nvPr/>
+        </p:nvPicPr>
+        <p:blipFill>
+          <a:blip r:embed="rId2"/>
+          <a:stretch>
+            <a:fillRect/>
+          </a:stretch>
+        </p:blipFill>
+        <p:spPr>
+          <a:xfrm>
+            <a:off x="677334" y="465918"/>
+            <a:ext cx="6944694" cy="5782482"/>
+          </a:xfrm>
+          <a:prstGeom prst="rect">
+            <a:avLst/>
+          </a:prstGeom>
+        </p:spPr>
+      </p:pic>
+      <p:pic>
+        <p:nvPicPr>
+          <p:cNvPr id="7" name="Picture 6">
+            <a:extLst>
+              <a:ext uri="{FF2B5EF4-FFF2-40B4-BE49-F238E27FC236}">
+                <a16:creationId xmlns:a16="http://schemas.microsoft.com/office/drawing/2014/main" id="{33C2624D-86C0-22EB-6AC3-108DBF3622C2}"/>
+              </a:ext>
+            </a:extLst>
+          </p:cNvPr>
+          <p:cNvPicPr>
+            <a:picLocks noChangeAspect="1"/>
+          </p:cNvPicPr>
+          <p:nvPr/>
+        </p:nvPicPr>
+        <p:blipFill>
+          <a:blip r:embed="rId3"/>
+          <a:stretch>
+            <a:fillRect/>
+          </a:stretch>
+        </p:blipFill>
+        <p:spPr>
+          <a:xfrm>
+            <a:off x="8345295" y="4799932"/>
+            <a:ext cx="2499776" cy="1448468"/>
+          </a:xfrm>
+          <a:prstGeom prst="rect">
+            <a:avLst/>
+          </a:prstGeom>
+        </p:spPr>
+      </p:pic>
+      <p:pic>
+        <p:nvPicPr>
+          <p:cNvPr id="9" name="Picture 8">
+            <a:extLst>
+              <a:ext uri="{FF2B5EF4-FFF2-40B4-BE49-F238E27FC236}">
+                <a16:creationId xmlns:a16="http://schemas.microsoft.com/office/drawing/2014/main" id="{5631C1BB-2127-E471-AB45-1B5BA655EBE7}"/>
+              </a:ext>
+            </a:extLst>
+          </p:cNvPr>
+          <p:cNvPicPr>
+            <a:picLocks noChangeAspect="1"/>
+          </p:cNvPicPr>
+          <p:nvPr/>
+        </p:nvPicPr>
+        <p:blipFill>
+          <a:blip r:embed="rId4"/>
+          <a:stretch>
+            <a:fillRect/>
+          </a:stretch>
+        </p:blipFill>
+        <p:spPr>
+          <a:xfrm>
+            <a:off x="7959841" y="384306"/>
+            <a:ext cx="3270684" cy="864664"/>
+          </a:xfrm>
+          <a:prstGeom prst="rect">
+            <a:avLst/>
+          </a:prstGeom>
+        </p:spPr>
+      </p:pic>
+      <p:pic>
+        <p:nvPicPr>
+          <p:cNvPr id="11" name="Picture 10">
+            <a:extLst>
+              <a:ext uri="{FF2B5EF4-FFF2-40B4-BE49-F238E27FC236}">
+                <a16:creationId xmlns:a16="http://schemas.microsoft.com/office/drawing/2014/main" id="{0CF0E058-929B-9BFD-0A5D-37D69F1ECAC4}"/>
+              </a:ext>
+            </a:extLst>
+          </p:cNvPr>
+          <p:cNvPicPr>
+            <a:picLocks noChangeAspect="1"/>
+          </p:cNvPicPr>
+          <p:nvPr/>
+        </p:nvPicPr>
+        <p:blipFill>
+          <a:blip r:embed="rId5"/>
+          <a:stretch>
+            <a:fillRect/>
+          </a:stretch>
+        </p:blipFill>
+        <p:spPr>
+          <a:xfrm>
+            <a:off x="7704320" y="1560282"/>
+            <a:ext cx="4089021" cy="772371"/>
+          </a:xfrm>
+          <a:prstGeom prst="rect">
+            <a:avLst/>
+          </a:prstGeom>
+        </p:spPr>
+      </p:pic>
+      <p:pic>
+        <p:nvPicPr>
+          <p:cNvPr id="13" name="Picture 12">
+            <a:extLst>
+              <a:ext uri="{FF2B5EF4-FFF2-40B4-BE49-F238E27FC236}">
+                <a16:creationId xmlns:a16="http://schemas.microsoft.com/office/drawing/2014/main" id="{8AA3EC43-59F2-0FF8-B7E7-1A763731CE0A}"/>
+              </a:ext>
+            </a:extLst>
+          </p:cNvPr>
+          <p:cNvPicPr>
+            <a:picLocks noChangeAspect="1"/>
+          </p:cNvPicPr>
+          <p:nvPr/>
+        </p:nvPicPr>
+        <p:blipFill>
+          <a:blip r:embed="rId6"/>
+          <a:stretch>
+            <a:fillRect/>
+          </a:stretch>
+        </p:blipFill>
+        <p:spPr>
+          <a:xfrm>
+            <a:off x="7831123" y="2881082"/>
+            <a:ext cx="3353268" cy="990738"/>
+          </a:xfrm>
+          <a:prstGeom prst="rect">
+            <a:avLst/>
+          </a:prstGeom>
+        </p:spPr>
+      </p:pic>
+    </p:spTree>
+    <p:extLst>
+      <p:ext uri="{BB962C8B-B14F-4D97-AF65-F5344CB8AC3E}">
+        <p14:creationId xmlns:p14="http://schemas.microsoft.com/office/powerpoint/2010/main" val="625864576"/>
+      </p:ext>
+    </p:extLst>
+  </p:cSld>
+  <p:clrMapOvr>
+    <a:masterClrMapping/>
+  </p:clrMapOvr>
+</p:sld>
+</file>
+
+<file path=ppt/slides/slide8.xml><?xml version="1.0" encoding="utf-8"?>
+<p:sld xmlns:a="http://schemas.openxmlformats.org/drawingml/2006/main" xmlns:r="http://schemas.openxmlformats.org/officeDocument/2006/relationships" xmlns:p="http://schemas.openxmlformats.org/presentationml/2006/main">
+  <p:cSld>
+    <p:spTree>
+      <p:nvGrpSpPr>
+        <p:cNvPr id="1" name=""/>
+        <p:cNvGrpSpPr/>
+        <p:nvPr/>
+      </p:nvGrpSpPr>
+      <p:grpSpPr>
+        <a:xfrm>
+          <a:off x="0" y="0"/>
+          <a:ext cx="0" cy="0"/>
+          <a:chOff x="0" y="0"/>
+          <a:chExt cx="0" cy="0"/>
+        </a:xfrm>
+      </p:grpSpPr>
+      <p:sp>
+        <p:nvSpPr>
+          <p:cNvPr id="2" name="Title 1">
+            <a:extLst>
+              <a:ext uri="{FF2B5EF4-FFF2-40B4-BE49-F238E27FC236}">
+                <a16:creationId xmlns:a16="http://schemas.microsoft.com/office/drawing/2014/main" id="{AE1B3B99-6516-3D07-C0D5-5CFB47421A84}"/>
+              </a:ext>
+            </a:extLst>
+          </p:cNvPr>
+          <p:cNvSpPr>
+            <a:spLocks noGrp="1"/>
+          </p:cNvSpPr>
+          <p:nvPr>
+            <p:ph type="title"/>
+          </p:nvPr>
+        </p:nvSpPr>
+        <p:spPr/>
+        <p:txBody>
+          <a:bodyPr/>
+          <a:lstStyle/>
+          <a:p>
+            <a:r>
+              <a:rPr lang="en-GB" dirty="0"/>
+              <a:t>Motion on retina</a:t>
+            </a:r>
+          </a:p>
+        </p:txBody>
+      </p:sp>
+      <p:pic>
+        <p:nvPicPr>
+          <p:cNvPr id="5" name="Content Placeholder 4" descr="A graph of a graph with lines and numbers&#10;&#10;Description automatically generated with medium confidence">
+            <a:extLst>
+              <a:ext uri="{FF2B5EF4-FFF2-40B4-BE49-F238E27FC236}">
+                <a16:creationId xmlns:a16="http://schemas.microsoft.com/office/drawing/2014/main" id="{302DE2FA-7B1A-3B3B-74B9-0DC1BB8C659F}"/>
+              </a:ext>
+            </a:extLst>
+          </p:cNvPr>
+          <p:cNvPicPr>
+            <a:picLocks noGrp="1" noChangeAspect="1"/>
+          </p:cNvPicPr>
+          <p:nvPr>
+            <p:ph idx="1"/>
+          </p:nvPr>
+        </p:nvPicPr>
+        <p:blipFill>
+          <a:blip r:embed="rId2">
+            <a:extLst>
+              <a:ext uri="{28A0092B-C50C-407E-A947-70E740481C1C}">
+                <a14:useLocalDpi xmlns:a14="http://schemas.microsoft.com/office/drawing/2010/main" val="0"/>
+              </a:ext>
+            </a:extLst>
+          </a:blip>
+          <a:stretch>
+            <a:fillRect/>
+          </a:stretch>
+        </p:blipFill>
+        <p:spPr>
+          <a:xfrm>
+            <a:off x="2220443" y="1270000"/>
+            <a:ext cx="6637866" cy="4978400"/>
+          </a:xfrm>
+        </p:spPr>
+      </p:pic>
+    </p:spTree>
+    <p:extLst>
+      <p:ext uri="{BB962C8B-B14F-4D97-AF65-F5344CB8AC3E}">
+        <p14:creationId xmlns:p14="http://schemas.microsoft.com/office/powerpoint/2010/main" val="3567695318"/>
+      </p:ext>
+    </p:extLst>
+  </p:cSld>
+  <p:clrMapOvr>
+    <a:masterClrMapping/>
+  </p:clrMapOvr>
+</p:sld>
+</file>
+
+<file path=ppt/slides/slide9.xml><?xml version="1.0" encoding="utf-8"?>
+<p:sld xmlns:a="http://schemas.openxmlformats.org/drawingml/2006/main" xmlns:r="http://schemas.openxmlformats.org/officeDocument/2006/relationships" xmlns:p="http://schemas.openxmlformats.org/presentationml/2006/main">
   <p:cSld>
     <p:spTree>
       <p:nvGrpSpPr>
@@ -15744,262 +16475,6 @@
     <p:extLst>
       <p:ext uri="{BB962C8B-B14F-4D97-AF65-F5344CB8AC3E}">
         <p14:creationId xmlns:p14="http://schemas.microsoft.com/office/powerpoint/2010/main" val="2577134400"/>
-      </p:ext>
-    </p:extLst>
-  </p:cSld>
-  <p:clrMapOvr>
-    <a:masterClrMapping/>
-  </p:clrMapOvr>
-</p:sld>
-</file>
-
-<file path=ppt/slides/slide8.xml><?xml version="1.0" encoding="utf-8"?>
-<p:sld xmlns:a="http://schemas.openxmlformats.org/drawingml/2006/main" xmlns:r="http://schemas.openxmlformats.org/officeDocument/2006/relationships" xmlns:p="http://schemas.openxmlformats.org/presentationml/2006/main">
-  <p:cSld>
-    <p:spTree>
-      <p:nvGrpSpPr>
-        <p:cNvPr id="1" name=""/>
-        <p:cNvGrpSpPr/>
-        <p:nvPr/>
-      </p:nvGrpSpPr>
-      <p:grpSpPr>
-        <a:xfrm>
-          <a:off x="0" y="0"/>
-          <a:ext cx="0" cy="0"/>
-          <a:chOff x="0" y="0"/>
-          <a:chExt cx="0" cy="0"/>
-        </a:xfrm>
-      </p:grpSpPr>
-      <p:sp>
-        <p:nvSpPr>
-          <p:cNvPr id="2" name="Title 1">
-            <a:extLst>
-              <a:ext uri="{FF2B5EF4-FFF2-40B4-BE49-F238E27FC236}">
-                <a16:creationId xmlns:a16="http://schemas.microsoft.com/office/drawing/2014/main" id="{53E40709-EF72-3ED9-A756-013935985EFE}"/>
-              </a:ext>
-            </a:extLst>
-          </p:cNvPr>
-          <p:cNvSpPr>
-            <a:spLocks noGrp="1"/>
-          </p:cNvSpPr>
-          <p:nvPr>
-            <p:ph type="title"/>
-          </p:nvPr>
-        </p:nvSpPr>
-        <p:spPr/>
-        <p:txBody>
-          <a:bodyPr/>
-          <a:lstStyle/>
-          <a:p>
-            <a:r>
-              <a:rPr lang="en-GB" dirty="0"/>
-              <a:t>Changes in elevation angle</a:t>
-            </a:r>
-          </a:p>
-        </p:txBody>
-      </p:sp>
-      <p:pic>
-        <p:nvPicPr>
-          <p:cNvPr id="5" name="Content Placeholder 4" descr="A graph of different colored lines&#10;&#10;Description automatically generated">
-            <a:extLst>
-              <a:ext uri="{FF2B5EF4-FFF2-40B4-BE49-F238E27FC236}">
-                <a16:creationId xmlns:a16="http://schemas.microsoft.com/office/drawing/2014/main" id="{BF43811D-4CA9-61A1-ED98-74E4C8F44D8C}"/>
-              </a:ext>
-            </a:extLst>
-          </p:cNvPr>
-          <p:cNvPicPr>
-            <a:picLocks noGrp="1" noChangeAspect="1"/>
-          </p:cNvPicPr>
-          <p:nvPr>
-            <p:ph idx="1"/>
-          </p:nvPr>
-        </p:nvPicPr>
-        <p:blipFill>
-          <a:blip r:embed="rId2">
-            <a:extLst>
-              <a:ext uri="{28A0092B-C50C-407E-A947-70E740481C1C}">
-                <a14:useLocalDpi xmlns:a14="http://schemas.microsoft.com/office/drawing/2010/main" val="0"/>
-              </a:ext>
-            </a:extLst>
-          </a:blip>
-          <a:stretch>
-            <a:fillRect/>
-          </a:stretch>
-        </p:blipFill>
-        <p:spPr>
-          <a:xfrm>
-            <a:off x="144917" y="1346402"/>
-            <a:ext cx="5852172" cy="4389129"/>
-          </a:xfrm>
-        </p:spPr>
-      </p:pic>
-      <p:pic>
-        <p:nvPicPr>
-          <p:cNvPr id="7" name="Picture 6">
-            <a:extLst>
-              <a:ext uri="{FF2B5EF4-FFF2-40B4-BE49-F238E27FC236}">
-                <a16:creationId xmlns:a16="http://schemas.microsoft.com/office/drawing/2014/main" id="{A3554DCB-5417-EA1E-0B73-A3BA693C381D}"/>
-              </a:ext>
-            </a:extLst>
-          </p:cNvPr>
-          <p:cNvPicPr>
-            <a:picLocks noChangeAspect="1"/>
-          </p:cNvPicPr>
-          <p:nvPr/>
-        </p:nvPicPr>
-        <p:blipFill>
-          <a:blip r:embed="rId3">
-            <a:extLst>
-              <a:ext uri="{28A0092B-C50C-407E-A947-70E740481C1C}">
-                <a14:useLocalDpi xmlns:a14="http://schemas.microsoft.com/office/drawing/2010/main" val="0"/>
-              </a:ext>
-            </a:extLst>
-          </a:blip>
-          <a:srcRect/>
-          <a:stretch/>
-        </p:blipFill>
-        <p:spPr>
-          <a:xfrm>
-            <a:off x="5997089" y="1346402"/>
-            <a:ext cx="5852172" cy="4389129"/>
-          </a:xfrm>
-          <a:prstGeom prst="rect">
-            <a:avLst/>
-          </a:prstGeom>
-        </p:spPr>
-      </p:pic>
-    </p:spTree>
-    <p:extLst>
-      <p:ext uri="{BB962C8B-B14F-4D97-AF65-F5344CB8AC3E}">
-        <p14:creationId xmlns:p14="http://schemas.microsoft.com/office/powerpoint/2010/main" val="2983568889"/>
-      </p:ext>
-    </p:extLst>
-  </p:cSld>
-  <p:clrMapOvr>
-    <a:masterClrMapping/>
-  </p:clrMapOvr>
-</p:sld>
-</file>
-
-<file path=ppt/slides/slide9.xml><?xml version="1.0" encoding="utf-8"?>
-<p:sld xmlns:a="http://schemas.openxmlformats.org/drawingml/2006/main" xmlns:r="http://schemas.openxmlformats.org/officeDocument/2006/relationships" xmlns:p="http://schemas.openxmlformats.org/presentationml/2006/main">
-  <p:cSld>
-    <p:spTree>
-      <p:nvGrpSpPr>
-        <p:cNvPr id="1" name=""/>
-        <p:cNvGrpSpPr/>
-        <p:nvPr/>
-      </p:nvGrpSpPr>
-      <p:grpSpPr>
-        <a:xfrm>
-          <a:off x="0" y="0"/>
-          <a:ext cx="0" cy="0"/>
-          <a:chOff x="0" y="0"/>
-          <a:chExt cx="0" cy="0"/>
-        </a:xfrm>
-      </p:grpSpPr>
-      <p:sp>
-        <p:nvSpPr>
-          <p:cNvPr id="2" name="Title 1">
-            <a:extLst>
-              <a:ext uri="{FF2B5EF4-FFF2-40B4-BE49-F238E27FC236}">
-                <a16:creationId xmlns:a16="http://schemas.microsoft.com/office/drawing/2014/main" id="{04AF809B-E1DD-09F0-7253-CE318852581B}"/>
-              </a:ext>
-            </a:extLst>
-          </p:cNvPr>
-          <p:cNvSpPr>
-            <a:spLocks noGrp="1"/>
-          </p:cNvSpPr>
-          <p:nvPr>
-            <p:ph type="title"/>
-          </p:nvPr>
-        </p:nvSpPr>
-        <p:spPr/>
-        <p:txBody>
-          <a:bodyPr/>
-          <a:lstStyle/>
-          <a:p>
-            <a:r>
-              <a:rPr lang="en-GB" dirty="0"/>
-              <a:t>Changes in azimuth angle</a:t>
-            </a:r>
-          </a:p>
-        </p:txBody>
-      </p:sp>
-      <p:pic>
-        <p:nvPicPr>
-          <p:cNvPr id="5" name="Content Placeholder 4" descr="A graph of different colored lines&#10;&#10;Description automatically generated">
-            <a:extLst>
-              <a:ext uri="{FF2B5EF4-FFF2-40B4-BE49-F238E27FC236}">
-                <a16:creationId xmlns:a16="http://schemas.microsoft.com/office/drawing/2014/main" id="{4AAC5DCB-87CC-9515-868A-AD1997ED18DA}"/>
-              </a:ext>
-            </a:extLst>
-          </p:cNvPr>
-          <p:cNvPicPr>
-            <a:picLocks noGrp="1" noChangeAspect="1"/>
-          </p:cNvPicPr>
-          <p:nvPr>
-            <p:ph idx="1"/>
-          </p:nvPr>
-        </p:nvPicPr>
-        <p:blipFill>
-          <a:blip r:embed="rId2">
-            <a:extLst>
-              <a:ext uri="{28A0092B-C50C-407E-A947-70E740481C1C}">
-                <a14:useLocalDpi xmlns:a14="http://schemas.microsoft.com/office/drawing/2010/main" val="0"/>
-              </a:ext>
-            </a:extLst>
-          </a:blip>
-          <a:stretch>
-            <a:fillRect/>
-          </a:stretch>
-        </p:blipFill>
-        <p:spPr>
-          <a:xfrm>
-            <a:off x="214361" y="1346354"/>
-            <a:ext cx="5733834" cy="4300376"/>
-          </a:xfrm>
-        </p:spPr>
-      </p:pic>
-      <p:pic>
-        <p:nvPicPr>
-          <p:cNvPr id="4" name="Picture 3">
-            <a:extLst>
-              <a:ext uri="{FF2B5EF4-FFF2-40B4-BE49-F238E27FC236}">
-                <a16:creationId xmlns:a16="http://schemas.microsoft.com/office/drawing/2014/main" id="{A581792F-E698-B13C-6099-4A4207C50F49}"/>
-              </a:ext>
-            </a:extLst>
-          </p:cNvPr>
-          <p:cNvPicPr>
-            <a:picLocks noChangeAspect="1"/>
-          </p:cNvPicPr>
-          <p:nvPr/>
-        </p:nvPicPr>
-        <p:blipFill>
-          <a:blip r:embed="rId3">
-            <a:extLst>
-              <a:ext uri="{28A0092B-C50C-407E-A947-70E740481C1C}">
-                <a14:useLocalDpi xmlns:a14="http://schemas.microsoft.com/office/drawing/2010/main" val="0"/>
-              </a:ext>
-            </a:extLst>
-          </a:blip>
-          <a:srcRect/>
-          <a:stretch/>
-        </p:blipFill>
-        <p:spPr>
-          <a:xfrm>
-            <a:off x="5594333" y="1257601"/>
-            <a:ext cx="5852172" cy="4389129"/>
-          </a:xfrm>
-          <a:prstGeom prst="rect">
-            <a:avLst/>
-          </a:prstGeom>
-        </p:spPr>
-      </p:pic>
-    </p:spTree>
-    <p:extLst>
-      <p:ext uri="{BB962C8B-B14F-4D97-AF65-F5344CB8AC3E}">
-        <p14:creationId xmlns:p14="http://schemas.microsoft.com/office/powerpoint/2010/main" val="846814401"/>
       </p:ext>
     </p:extLst>
   </p:cSld>

</xml_diff>